<commit_message>
Etki/Java: Compile-Time Annotation Processing: minor updates & exported pdf
</commit_message>
<xml_diff>
--- a/src/etki/2018/11/java-compile-time-annotation-processing/compile-time-annotation-processing.pptx
+++ b/src/etki/2018/11/java-compile-time-annotation-processing/compile-time-annotation-processing.pptx
@@ -114,7 +114,7 @@
 </p:presentation>
 </file>
 
-<file path=ppt/charts/chart22.xml><?xml version="1.0" encoding="utf-8"?>
+<file path=ppt/charts/chart1.xml><?xml version="1.0" encoding="utf-8"?>
 <c:chartSpace xmlns:c="http://schemas.openxmlformats.org/drawingml/2006/chart" xmlns:a="http://schemas.openxmlformats.org/drawingml/2006/main" xmlns:r="http://schemas.openxmlformats.org/officeDocument/2006/relationships">
   <c:lang val="en-US"/>
   <c:roundedCorners val="0"/>
@@ -318,11 +318,11 @@
         </c:ser>
         <c:gapWidth val="100"/>
         <c:overlap val="0"/>
-        <c:axId val="62333520"/>
-        <c:axId val="94944939"/>
+        <c:axId val="19411439"/>
+        <c:axId val="43673703"/>
       </c:barChart>
       <c:catAx>
-        <c:axId val="62333520"/>
+        <c:axId val="19411439"/>
         <c:scaling>
           <c:orientation val="minMax"/>
         </c:scaling>
@@ -355,14 +355,14 @@
             </a:pPr>
           </a:p>
         </c:txPr>
-        <c:crossAx val="94944939"/>
+        <c:crossAx val="43673703"/>
         <c:crosses val="autoZero"/>
         <c:auto val="1"/>
         <c:lblAlgn val="ctr"/>
         <c:lblOffset val="100"/>
       </c:catAx>
       <c:valAx>
-        <c:axId val="94944939"/>
+        <c:axId val="43673703"/>
         <c:scaling>
           <c:orientation val="minMax"/>
         </c:scaling>
@@ -395,7 +395,7 @@
             </a:pPr>
           </a:p>
         </c:txPr>
-        <c:crossAx val="62333520"/>
+        <c:crossAx val="19411439"/>
         <c:crossesAt val="1"/>
       </c:valAx>
       <c:spPr>
@@ -5834,7 +5834,7 @@
           <a:p>
             <a:pPr marL="432000" indent="-324000">
               <a:spcBef>
-                <a:spcPts val="1414"/>
+                <a:spcPts val="1417"/>
               </a:spcBef>
               <a:buClr>
                 <a:srgbClr val="000000"/>
@@ -6092,7 +6092,7 @@
           <a:p>
             <a:pPr marL="432000" indent="-324000">
               <a:spcBef>
-                <a:spcPts val="1414"/>
+                <a:spcPts val="1417"/>
               </a:spcBef>
               <a:buClr>
                 <a:srgbClr val="000000"/>
@@ -6343,7 +6343,7 @@
           <a:p>
             <a:pPr marL="432000" indent="-324000">
               <a:spcBef>
-                <a:spcPts val="1414"/>
+                <a:spcPts val="1417"/>
               </a:spcBef>
               <a:buClr>
                 <a:srgbClr val="000000"/>
@@ -6594,7 +6594,7 @@
           <a:p>
             <a:pPr marL="432000" indent="-324000">
               <a:spcBef>
-                <a:spcPts val="1414"/>
+                <a:spcPts val="1417"/>
               </a:spcBef>
               <a:buClr>
                 <a:srgbClr val="000000"/>
@@ -6800,7 +6800,7 @@
         <p:spPr>
           <a:xfrm>
             <a:off x="502920" y="300600"/>
-            <a:ext cx="9065520" cy="7012800"/>
+            <a:ext cx="9065160" cy="7012440"/>
           </a:xfrm>
           <a:prstGeom prst="rect">
             <a:avLst/>
@@ -6913,7 +6913,7 @@
         <p:spPr>
           <a:xfrm>
             <a:off x="360" y="360"/>
-            <a:ext cx="10074600" cy="1562040"/>
+            <a:ext cx="10074240" cy="1561680"/>
           </a:xfrm>
           <a:prstGeom prst="rect">
             <a:avLst/>
@@ -6964,7 +6964,7 @@
         <p:spPr>
           <a:xfrm>
             <a:off x="502920" y="1768680"/>
-            <a:ext cx="9065520" cy="4383000"/>
+            <a:ext cx="9065160" cy="4382640"/>
           </a:xfrm>
           <a:prstGeom prst="rect">
             <a:avLst/>
@@ -7127,7 +7127,7 @@
         <p:spPr>
           <a:xfrm>
             <a:off x="502920" y="300600"/>
-            <a:ext cx="9065520" cy="6921000"/>
+            <a:ext cx="9065160" cy="6920640"/>
           </a:xfrm>
           <a:prstGeom prst="rect">
             <a:avLst/>
@@ -7240,7 +7240,7 @@
         <p:spPr>
           <a:xfrm>
             <a:off x="0" y="0"/>
-            <a:ext cx="10076040" cy="1559520"/>
+            <a:ext cx="10075680" cy="1559160"/>
           </a:xfrm>
           <a:prstGeom prst="rect">
             <a:avLst/>
@@ -7291,7 +7291,7 @@
         <p:spPr>
           <a:xfrm>
             <a:off x="502920" y="1768680"/>
-            <a:ext cx="9065520" cy="4383000"/>
+            <a:ext cx="9065160" cy="4382640"/>
           </a:xfrm>
           <a:prstGeom prst="rect">
             <a:avLst/>
@@ -7464,7 +7464,7 @@
         <p:spPr>
           <a:xfrm>
             <a:off x="502920" y="300600"/>
-            <a:ext cx="9065520" cy="6736320"/>
+            <a:ext cx="9065160" cy="6735960"/>
           </a:xfrm>
           <a:prstGeom prst="rect">
             <a:avLst/>
@@ -7577,7 +7577,7 @@
         <p:spPr>
           <a:xfrm>
             <a:off x="0" y="0"/>
-            <a:ext cx="10076040" cy="1561320"/>
+            <a:ext cx="10075680" cy="1560960"/>
           </a:xfrm>
           <a:prstGeom prst="rect">
             <a:avLst/>
@@ -7628,7 +7628,7 @@
         <p:spPr>
           <a:xfrm>
             <a:off x="502920" y="1768680"/>
-            <a:ext cx="9065520" cy="4383000"/>
+            <a:ext cx="9065160" cy="4382640"/>
           </a:xfrm>
           <a:prstGeom prst="rect">
             <a:avLst/>
@@ -7781,7 +7781,7 @@
         <p:spPr>
           <a:xfrm>
             <a:off x="0" y="0"/>
-            <a:ext cx="10076040" cy="1561320"/>
+            <a:ext cx="10075680" cy="1560960"/>
           </a:xfrm>
           <a:prstGeom prst="rect">
             <a:avLst/>
@@ -7832,7 +7832,7 @@
         <p:spPr>
           <a:xfrm>
             <a:off x="502920" y="1768680"/>
-            <a:ext cx="9065520" cy="4383000"/>
+            <a:ext cx="9065160" cy="4382640"/>
           </a:xfrm>
           <a:prstGeom prst="rect">
             <a:avLst/>
@@ -7985,7 +7985,7 @@
         <p:spPr>
           <a:xfrm>
             <a:off x="0" y="0"/>
-            <a:ext cx="10076040" cy="1561320"/>
+            <a:ext cx="10075680" cy="1560960"/>
           </a:xfrm>
           <a:prstGeom prst="rect">
             <a:avLst/>
@@ -8036,7 +8036,7 @@
         <p:spPr>
           <a:xfrm>
             <a:off x="502920" y="1768680"/>
-            <a:ext cx="9065520" cy="4383000"/>
+            <a:ext cx="9065160" cy="4382640"/>
           </a:xfrm>
           <a:prstGeom prst="rect">
             <a:avLst/>
@@ -8189,7 +8189,7 @@
         <p:spPr>
           <a:xfrm>
             <a:off x="502920" y="300600"/>
-            <a:ext cx="9065520" cy="6921000"/>
+            <a:ext cx="9065160" cy="6920640"/>
           </a:xfrm>
           <a:prstGeom prst="rect">
             <a:avLst/>
@@ -8302,7 +8302,7 @@
         <p:spPr>
           <a:xfrm>
             <a:off x="0" y="0"/>
-            <a:ext cx="10076040" cy="1561320"/>
+            <a:ext cx="10075680" cy="1560960"/>
           </a:xfrm>
           <a:prstGeom prst="rect">
             <a:avLst/>
@@ -8353,7 +8353,7 @@
         <p:spPr>
           <a:xfrm>
             <a:off x="502920" y="2092680"/>
-            <a:ext cx="9065520" cy="4383000"/>
+            <a:ext cx="9065160" cy="4382640"/>
           </a:xfrm>
           <a:prstGeom prst="rect">
             <a:avLst/>
@@ -8646,7 +8646,7 @@
         <p:spPr>
           <a:xfrm>
             <a:off x="0" y="0"/>
-            <a:ext cx="10076040" cy="1561320"/>
+            <a:ext cx="10075680" cy="1560960"/>
           </a:xfrm>
           <a:prstGeom prst="rect">
             <a:avLst/>
@@ -8697,7 +8697,7 @@
         <p:spPr>
           <a:xfrm>
             <a:off x="502920" y="2272680"/>
-            <a:ext cx="9065520" cy="4383000"/>
+            <a:ext cx="9065160" cy="4382640"/>
           </a:xfrm>
           <a:prstGeom prst="rect">
             <a:avLst/>
@@ -9010,7 +9010,7 @@
         <p:spPr>
           <a:xfrm>
             <a:off x="502920" y="300600"/>
-            <a:ext cx="9065520" cy="6921000"/>
+            <a:ext cx="9065160" cy="6920640"/>
           </a:xfrm>
           <a:prstGeom prst="rect">
             <a:avLst/>
@@ -9120,7 +9120,7 @@
         <p:spPr>
           <a:xfrm>
             <a:off x="276480" y="1895760"/>
-            <a:ext cx="9524160" cy="3771360"/>
+            <a:ext cx="9523800" cy="3771000"/>
           </a:xfrm>
           <a:prstGeom prst="rect">
             <a:avLst/>
@@ -9203,7 +9203,7 @@
         <p:spPr>
           <a:xfrm>
             <a:off x="502920" y="300600"/>
-            <a:ext cx="9065520" cy="6921000"/>
+            <a:ext cx="9065160" cy="6920640"/>
           </a:xfrm>
           <a:prstGeom prst="rect">
             <a:avLst/>
@@ -9316,7 +9316,7 @@
         <p:spPr>
           <a:xfrm>
             <a:off x="0" y="0"/>
-            <a:ext cx="10076040" cy="1561320"/>
+            <a:ext cx="10075680" cy="1560960"/>
           </a:xfrm>
           <a:prstGeom prst="rect">
             <a:avLst/>
@@ -9367,7 +9367,7 @@
         <p:spPr>
           <a:xfrm>
             <a:off x="502920" y="2272680"/>
-            <a:ext cx="9065520" cy="4383000"/>
+            <a:ext cx="9065160" cy="4382640"/>
           </a:xfrm>
           <a:prstGeom prst="rect">
             <a:avLst/>
@@ -9670,7 +9670,7 @@
         <p:spPr>
           <a:xfrm>
             <a:off x="0" y="0"/>
-            <a:ext cx="10076040" cy="1561320"/>
+            <a:ext cx="10075680" cy="1560960"/>
           </a:xfrm>
           <a:prstGeom prst="rect">
             <a:avLst/>
@@ -9721,7 +9721,7 @@
         <p:spPr>
           <a:xfrm>
             <a:off x="502920" y="2272680"/>
-            <a:ext cx="9065520" cy="4383000"/>
+            <a:ext cx="9065160" cy="4382640"/>
           </a:xfrm>
           <a:prstGeom prst="rect">
             <a:avLst/>
@@ -9914,7 +9914,7 @@
         <p:spPr>
           <a:xfrm>
             <a:off x="0" y="0"/>
-            <a:ext cx="10076040" cy="1561320"/>
+            <a:ext cx="10075680" cy="1560960"/>
           </a:xfrm>
           <a:prstGeom prst="rect">
             <a:avLst/>
@@ -9965,7 +9965,7 @@
         <p:spPr>
           <a:xfrm>
             <a:off x="502920" y="2488680"/>
-            <a:ext cx="9065520" cy="4383000"/>
+            <a:ext cx="9065160" cy="4382640"/>
           </a:xfrm>
           <a:prstGeom prst="rect">
             <a:avLst/>
@@ -9991,7 +9991,7 @@
         <p:spPr>
           <a:xfrm>
             <a:off x="5943600" y="5495040"/>
-            <a:ext cx="3474360" cy="626400"/>
+            <a:ext cx="3474000" cy="626040"/>
           </a:xfrm>
           <a:prstGeom prst="rect">
             <a:avLst/>
@@ -10023,6 +10023,7 @@
                   <a:srgbClr val="ffffff"/>
                 </a:solidFill>
                 <a:latin typeface="Noto Mono"/>
+                <a:ea typeface="DejaVu Sans"/>
               </a:rPr>
               <a:t>Processor.process()</a:t>
             </a:r>
@@ -10041,7 +10042,7 @@
         <p:spPr>
           <a:xfrm>
             <a:off x="1097280" y="5494320"/>
-            <a:ext cx="3474360" cy="626400"/>
+            <a:ext cx="3474000" cy="626040"/>
           </a:xfrm>
           <a:prstGeom prst="rect">
             <a:avLst/>
@@ -10073,6 +10074,7 @@
                   <a:srgbClr val="ffffff"/>
                 </a:solidFill>
                 <a:latin typeface="Noto Mono"/>
+                <a:ea typeface="DejaVu Sans"/>
               </a:rPr>
               <a:t>Filer.createSourceFile()</a:t>
             </a:r>
@@ -10091,7 +10093,7 @@
         <p:spPr>
           <a:xfrm>
             <a:off x="3987000" y="3391200"/>
-            <a:ext cx="2102760" cy="626400"/>
+            <a:ext cx="2102400" cy="626040"/>
           </a:xfrm>
           <a:prstGeom prst="rect">
             <a:avLst/>
@@ -10123,6 +10125,7 @@
                   <a:srgbClr val="ffffff"/>
                 </a:solidFill>
                 <a:latin typeface="Noto Mono"/>
+                <a:ea typeface="DejaVu Sans"/>
               </a:rPr>
               <a:t>javac</a:t>
             </a:r>
@@ -10140,8 +10143,8 @@
         </p:nvSpPr>
         <p:spPr>
           <a:xfrm flipV="1">
-            <a:off x="2834640" y="3704400"/>
-            <a:ext cx="1152360" cy="1789920"/>
+            <a:off x="2834640" y="3703680"/>
+            <a:ext cx="1152000" cy="1789560"/>
           </a:xfrm>
           <a:prstGeom prst="curvedConnector3">
             <a:avLst>
@@ -10173,7 +10176,7 @@
         <p:spPr>
           <a:xfrm>
             <a:off x="6090120" y="3704400"/>
-            <a:ext cx="1590840" cy="1790640"/>
+            <a:ext cx="1590480" cy="1790280"/>
           </a:xfrm>
           <a:prstGeom prst="curvedConnector3">
             <a:avLst>
@@ -10204,8 +10207,8 @@
         </p:nvSpPr>
         <p:spPr>
           <a:xfrm flipH="1" flipV="1">
-            <a:off x="4572000" y="5807520"/>
-            <a:ext cx="1371600" cy="720"/>
+            <a:off x="4571280" y="5806800"/>
+            <a:ext cx="1371240" cy="360"/>
           </a:xfrm>
           <a:prstGeom prst="curvedConnector3">
             <a:avLst>
@@ -10237,7 +10240,7 @@
         <p:spPr>
           <a:xfrm>
             <a:off x="2560320" y="2462760"/>
-            <a:ext cx="2478240" cy="928440"/>
+            <a:ext cx="2477880" cy="928080"/>
           </a:xfrm>
           <a:prstGeom prst="curvedConnector3">
             <a:avLst>
@@ -10269,7 +10272,7 @@
         <p:spPr>
           <a:xfrm>
             <a:off x="457200" y="2149560"/>
-            <a:ext cx="2102760" cy="626400"/>
+            <a:ext cx="2102400" cy="626040"/>
           </a:xfrm>
           <a:prstGeom prst="rect">
             <a:avLst/>
@@ -10301,6 +10304,7 @@
                   <a:srgbClr val="ffffff"/>
                 </a:solidFill>
                 <a:latin typeface="Noto Mono"/>
+                <a:ea typeface="DejaVu Sans"/>
               </a:rPr>
               <a:t>invocation</a:t>
             </a:r>
@@ -10383,7 +10387,7 @@
         <p:spPr>
           <a:xfrm>
             <a:off x="502920" y="300600"/>
-            <a:ext cx="9065520" cy="6921000"/>
+            <a:ext cx="9065160" cy="6920640"/>
           </a:xfrm>
           <a:prstGeom prst="rect">
             <a:avLst/>
@@ -10496,7 +10500,7 @@
         <p:spPr>
           <a:xfrm>
             <a:off x="0" y="0"/>
-            <a:ext cx="10076040" cy="1561320"/>
+            <a:ext cx="10075680" cy="1560960"/>
           </a:xfrm>
           <a:prstGeom prst="rect">
             <a:avLst/>
@@ -10547,7 +10551,7 @@
         <p:spPr>
           <a:xfrm>
             <a:off x="502920" y="2272680"/>
-            <a:ext cx="9065520" cy="4383000"/>
+            <a:ext cx="9065160" cy="4382640"/>
           </a:xfrm>
           <a:prstGeom prst="rect">
             <a:avLst/>
@@ -10750,7 +10754,7 @@
         <p:spPr>
           <a:xfrm>
             <a:off x="0" y="0"/>
-            <a:ext cx="10076040" cy="1561320"/>
+            <a:ext cx="10075680" cy="1560960"/>
           </a:xfrm>
           <a:prstGeom prst="rect">
             <a:avLst/>
@@ -10801,7 +10805,7 @@
         <p:spPr>
           <a:xfrm>
             <a:off x="502920" y="2272680"/>
-            <a:ext cx="9065520" cy="4383000"/>
+            <a:ext cx="9065160" cy="4382640"/>
           </a:xfrm>
           <a:prstGeom prst="rect">
             <a:avLst/>
@@ -10914,7 +10918,7 @@
         <p:spPr>
           <a:xfrm>
             <a:off x="0" y="0"/>
-            <a:ext cx="10076040" cy="1561320"/>
+            <a:ext cx="10075680" cy="1560960"/>
           </a:xfrm>
           <a:prstGeom prst="rect">
             <a:avLst/>
@@ -10965,7 +10969,7 @@
         <p:spPr>
           <a:xfrm>
             <a:off x="502920" y="2272680"/>
-            <a:ext cx="9065520" cy="4383000"/>
+            <a:ext cx="9065160" cy="4382640"/>
           </a:xfrm>
           <a:prstGeom prst="rect">
             <a:avLst/>
@@ -10995,7 +10999,7 @@
         <p:spPr>
           <a:xfrm>
             <a:off x="284040" y="2651760"/>
-            <a:ext cx="9509040" cy="3411720"/>
+            <a:ext cx="9508680" cy="3411360"/>
           </a:xfrm>
           <a:prstGeom prst="rect">
             <a:avLst/>
@@ -11078,7 +11082,7 @@
         <p:spPr>
           <a:xfrm>
             <a:off x="0" y="0"/>
-            <a:ext cx="10076040" cy="1561320"/>
+            <a:ext cx="10075680" cy="1560960"/>
           </a:xfrm>
           <a:prstGeom prst="rect">
             <a:avLst/>
@@ -11129,7 +11133,7 @@
         <p:spPr>
           <a:xfrm>
             <a:off x="502920" y="2272680"/>
-            <a:ext cx="9065520" cy="4383000"/>
+            <a:ext cx="9065160" cy="4382640"/>
           </a:xfrm>
           <a:prstGeom prst="rect">
             <a:avLst/>
@@ -11272,7 +11276,7 @@
         <p:spPr>
           <a:xfrm>
             <a:off x="502920" y="300600"/>
-            <a:ext cx="9065520" cy="6921000"/>
+            <a:ext cx="9065160" cy="6920640"/>
           </a:xfrm>
           <a:prstGeom prst="rect">
             <a:avLst/>
@@ -11378,7 +11382,7 @@
         <p:spPr>
           <a:xfrm>
             <a:off x="0" y="0"/>
-            <a:ext cx="10073520" cy="4663440"/>
+            <a:ext cx="10073160" cy="4663080"/>
           </a:xfrm>
           <a:prstGeom prst="rect">
             <a:avLst/>
@@ -11406,7 +11410,7 @@
         <p:spPr>
           <a:xfrm>
             <a:off x="829440" y="3425760"/>
-            <a:ext cx="2416680" cy="2417400"/>
+            <a:ext cx="2416320" cy="2417040"/>
           </a:xfrm>
           <a:prstGeom prst="ellipse">
             <a:avLst/>
@@ -11460,7 +11464,7 @@
         <p:spPr>
           <a:xfrm>
             <a:off x="3457800" y="4854240"/>
-            <a:ext cx="5940720" cy="643320"/>
+            <a:ext cx="5940360" cy="642960"/>
           </a:xfrm>
           <a:prstGeom prst="rect">
             <a:avLst/>
@@ -11490,6 +11494,7 @@
                   <a:srgbClr val="ffffff"/>
                 </a:solidFill>
                 <a:latin typeface="Noto Sans"/>
+                <a:ea typeface="DejaVu Sans"/>
               </a:rPr>
               <a:t>Argumentum ad verecundiam</a:t>
             </a:r>
@@ -11572,7 +11577,7 @@
         <p:spPr>
           <a:xfrm>
             <a:off x="0" y="0"/>
-            <a:ext cx="10076040" cy="1561320"/>
+            <a:ext cx="10075680" cy="1560960"/>
           </a:xfrm>
           <a:prstGeom prst="rect">
             <a:avLst/>
@@ -11623,7 +11628,7 @@
         <p:spPr>
           <a:xfrm>
             <a:off x="502920" y="2272680"/>
-            <a:ext cx="9065520" cy="4383000"/>
+            <a:ext cx="9065160" cy="4382640"/>
           </a:xfrm>
           <a:prstGeom prst="rect">
             <a:avLst/>
@@ -11766,7 +11771,7 @@
         <p:spPr>
           <a:xfrm>
             <a:off x="0" y="0"/>
-            <a:ext cx="10076040" cy="1561320"/>
+            <a:ext cx="10075680" cy="1560960"/>
           </a:xfrm>
           <a:prstGeom prst="rect">
             <a:avLst/>
@@ -11817,7 +11822,7 @@
         <p:spPr>
           <a:xfrm>
             <a:off x="365760" y="2373840"/>
-            <a:ext cx="9326520" cy="3103200"/>
+            <a:ext cx="9326160" cy="3102840"/>
           </a:xfrm>
           <a:prstGeom prst="rect">
             <a:avLst/>
@@ -11849,6 +11854,7 @@
                   <a:srgbClr val="f6343f"/>
                 </a:solidFill>
                 <a:latin typeface="Noto Mono"/>
+                <a:ea typeface="DejaVu Sans"/>
               </a:rPr>
               <a:t>processingEnv</a:t>
             </a:r>
@@ -11868,6 +11874,7 @@
                   <a:srgbClr val="f6343f"/>
                 </a:solidFill>
                 <a:latin typeface="Noto Mono"/>
+                <a:ea typeface="DejaVu Sans"/>
               </a:rPr>
               <a:t>  </a:t>
             </a:r>
@@ -11877,6 +11884,7 @@
                   <a:srgbClr val="f6343f"/>
                 </a:solidFill>
                 <a:latin typeface="Noto Mono"/>
+                <a:ea typeface="DejaVu Sans"/>
               </a:rPr>
               <a:t>.getFiler()</a:t>
             </a:r>
@@ -11896,6 +11904,7 @@
                   <a:srgbClr val="f6343f"/>
                 </a:solidFill>
                 <a:latin typeface="Noto Mono"/>
+                <a:ea typeface="DejaVu Sans"/>
               </a:rPr>
               <a:t>  </a:t>
             </a:r>
@@ -11905,6 +11914,7 @@
                   <a:srgbClr val="f6343f"/>
                 </a:solidFill>
                 <a:latin typeface="Noto Mono"/>
+                <a:ea typeface="DejaVu Sans"/>
               </a:rPr>
               <a:t>.createSourceFile("pkg.Generated")</a:t>
             </a:r>
@@ -11954,6 +11964,7 @@
                   <a:srgbClr val="f6343f"/>
                 </a:solidFill>
                 <a:latin typeface="Noto Mono"/>
+                <a:ea typeface="DejaVu Sans"/>
               </a:rPr>
               <a:t>  </a:t>
             </a:r>
@@ -11963,6 +11974,7 @@
                   <a:srgbClr val="f6343f"/>
                 </a:solidFill>
                 <a:latin typeface="Noto Mono"/>
+                <a:ea typeface="DejaVu Sans"/>
               </a:rPr>
               <a:t>.append("package pkg;\n\n")</a:t>
             </a:r>
@@ -11982,6 +11994,7 @@
                   <a:srgbClr val="f6343f"/>
                 </a:solidFill>
                 <a:latin typeface="Noto Mono"/>
+                <a:ea typeface="DejaVu Sans"/>
               </a:rPr>
               <a:t>  </a:t>
             </a:r>
@@ -11991,6 +12004,7 @@
                   <a:srgbClr val="f6343f"/>
                 </a:solidFill>
                 <a:latin typeface="Noto Mono"/>
+                <a:ea typeface="DejaVu Sans"/>
               </a:rPr>
               <a:t>.append("class Generated {}\n")</a:t>
             </a:r>
@@ -12010,6 +12024,7 @@
                   <a:srgbClr val="f6343f"/>
                 </a:solidFill>
                 <a:latin typeface="Noto Mono"/>
+                <a:ea typeface="DejaVu Sans"/>
               </a:rPr>
               <a:t>  </a:t>
             </a:r>
@@ -12019,6 +12034,7 @@
                   <a:srgbClr val="f6343f"/>
                 </a:solidFill>
                 <a:latin typeface="Noto Mono"/>
+                <a:ea typeface="DejaVu Sans"/>
               </a:rPr>
               <a:t>.close();</a:t>
             </a:r>
@@ -12101,7 +12117,7 @@
         <p:spPr>
           <a:xfrm>
             <a:off x="0" y="0"/>
-            <a:ext cx="10076040" cy="1561320"/>
+            <a:ext cx="10075680" cy="1560960"/>
           </a:xfrm>
           <a:prstGeom prst="rect">
             <a:avLst/>
@@ -12156,7 +12172,7 @@
         <p:spPr>
           <a:xfrm>
             <a:off x="1185480" y="2326680"/>
-            <a:ext cx="7706160" cy="4057560"/>
+            <a:ext cx="7705800" cy="4057200"/>
           </a:xfrm>
           <a:prstGeom prst="rect">
             <a:avLst/>
@@ -12239,7 +12255,7 @@
         <p:spPr>
           <a:xfrm>
             <a:off x="0" y="0"/>
-            <a:ext cx="10076040" cy="1561320"/>
+            <a:ext cx="10075680" cy="1560960"/>
           </a:xfrm>
           <a:prstGeom prst="rect">
             <a:avLst/>
@@ -12294,7 +12310,7 @@
         <p:spPr>
           <a:xfrm>
             <a:off x="2406240" y="1920240"/>
-            <a:ext cx="5265000" cy="4663440"/>
+            <a:ext cx="5264640" cy="4663080"/>
           </a:xfrm>
           <a:prstGeom prst="rect">
             <a:avLst/>
@@ -12377,7 +12393,7 @@
         <p:spPr>
           <a:xfrm>
             <a:off x="502920" y="300600"/>
-            <a:ext cx="9065520" cy="6921000"/>
+            <a:ext cx="9065160" cy="6920640"/>
           </a:xfrm>
           <a:prstGeom prst="rect">
             <a:avLst/>
@@ -12510,7 +12526,7 @@
         <p:spPr>
           <a:xfrm>
             <a:off x="0" y="0"/>
-            <a:ext cx="10076040" cy="1561320"/>
+            <a:ext cx="10075680" cy="1560960"/>
           </a:xfrm>
           <a:prstGeom prst="rect">
             <a:avLst/>
@@ -12561,7 +12577,7 @@
         <p:spPr>
           <a:xfrm>
             <a:off x="365760" y="2898000"/>
-            <a:ext cx="9326520" cy="2188800"/>
+            <a:ext cx="9326160" cy="2188440"/>
           </a:xfrm>
           <a:prstGeom prst="rect">
             <a:avLst/>
@@ -12593,6 +12609,7 @@
                   <a:srgbClr val="f6343f"/>
                 </a:solidFill>
                 <a:latin typeface="Noto Mono"/>
+                <a:ea typeface="DejaVu Sans"/>
               </a:rPr>
               <a:t>processingEnv</a:t>
             </a:r>
@@ -12612,6 +12629,7 @@
                   <a:srgbClr val="f6343f"/>
                 </a:solidFill>
                 <a:latin typeface="Noto Mono"/>
+                <a:ea typeface="DejaVu Sans"/>
               </a:rPr>
               <a:t>  </a:t>
             </a:r>
@@ -12621,6 +12639,7 @@
                   <a:srgbClr val="f6343f"/>
                 </a:solidFill>
                 <a:latin typeface="Noto Mono"/>
+                <a:ea typeface="DejaVu Sans"/>
               </a:rPr>
               <a:t>.getFiler()</a:t>
             </a:r>
@@ -12640,6 +12659,7 @@
                   <a:srgbClr val="f6343f"/>
                 </a:solidFill>
                 <a:latin typeface="Noto Mono"/>
+                <a:ea typeface="DejaVu Sans"/>
               </a:rPr>
               <a:t>  </a:t>
             </a:r>
@@ -12649,6 +12669,7 @@
                   <a:srgbClr val="f6343f"/>
                 </a:solidFill>
                 <a:latin typeface="Noto Mono"/>
+                <a:ea typeface="DejaVu Sans"/>
               </a:rPr>
               <a:t>.createClassFile("pkg.Generated")</a:t>
             </a:r>
@@ -12698,6 +12719,7 @@
                   <a:srgbClr val="f6343f"/>
                 </a:solidFill>
                 <a:latin typeface="Noto Mono"/>
+                <a:ea typeface="DejaVu Sans"/>
               </a:rPr>
               <a:t>  </a:t>
             </a:r>
@@ -12707,6 +12729,7 @@
                   <a:srgbClr val="f6343f"/>
                 </a:solidFill>
                 <a:latin typeface="Noto Mono"/>
+                <a:ea typeface="DejaVu Sans"/>
               </a:rPr>
               <a:t>.write(bytes);</a:t>
             </a:r>
@@ -12789,7 +12812,7 @@
         <p:spPr>
           <a:xfrm>
             <a:off x="0" y="0"/>
-            <a:ext cx="10076040" cy="1561320"/>
+            <a:ext cx="10075680" cy="1560960"/>
           </a:xfrm>
           <a:prstGeom prst="rect">
             <a:avLst/>
@@ -12833,14 +12856,14 @@
       </p:sp>
       <p:sp>
         <p:nvSpPr>
-          <p:cNvPr id="222" name="TextShape 2"/>
-          <p:cNvSpPr txBox="1"/>
+          <p:cNvPr id="222" name="CustomShape 2"/>
+          <p:cNvSpPr/>
           <p:nvPr/>
         </p:nvSpPr>
         <p:spPr>
           <a:xfrm>
             <a:off x="2112480" y="3931920"/>
-            <a:ext cx="5852160" cy="657360"/>
+            <a:ext cx="5851800" cy="657000"/>
           </a:xfrm>
           <a:prstGeom prst="rect">
             <a:avLst/>
@@ -12850,10 +12873,20 @@
             <a:noFill/>
           </a:ln>
         </p:spPr>
+        <p:style>
+          <a:lnRef idx="0"/>
+          <a:fillRef idx="0"/>
+          <a:effectRef idx="0"/>
+          <a:fontRef idx="minor"/>
+        </p:style>
         <p:txBody>
           <a:bodyPr lIns="90000" rIns="90000" tIns="45000" bIns="45000"/>
           <a:p>
-            <a:pPr algn="ctr"/>
+            <a:pPr algn="ctr">
+              <a:lnSpc>
+                <a:spcPct val="100000"/>
+              </a:lnSpc>
+            </a:pPr>
             <a:r>
               <a:rPr b="0" lang="en-US" sz="4000" spc="-1" strike="noStrike">
                 <a:solidFill>
@@ -12864,9 +12897,6 @@
               <a:t>Но вот только зачем?</a:t>
             </a:r>
             <a:endParaRPr b="0" lang="en-US" sz="4000" spc="-1" strike="noStrike">
-              <a:solidFill>
-                <a:srgbClr val="f6343f"/>
-              </a:solidFill>
               <a:latin typeface="Arial"/>
             </a:endParaRPr>
           </a:p>
@@ -12945,7 +12975,7 @@
         <p:spPr>
           <a:xfrm>
             <a:off x="502920" y="300600"/>
-            <a:ext cx="9065520" cy="6921000"/>
+            <a:ext cx="9065160" cy="6920640"/>
           </a:xfrm>
           <a:prstGeom prst="rect">
             <a:avLst/>
@@ -13058,7 +13088,7 @@
         <p:spPr>
           <a:xfrm>
             <a:off x="0" y="0"/>
-            <a:ext cx="10076040" cy="1561320"/>
+            <a:ext cx="10075680" cy="1560960"/>
           </a:xfrm>
           <a:prstGeom prst="rect">
             <a:avLst/>
@@ -13109,7 +13139,7 @@
         <p:spPr>
           <a:xfrm>
             <a:off x="502920" y="2272680"/>
-            <a:ext cx="9065520" cy="4383000"/>
+            <a:ext cx="9065160" cy="4382640"/>
           </a:xfrm>
           <a:prstGeom prst="rect">
             <a:avLst/>
@@ -13222,7 +13252,7 @@
         <p:spPr>
           <a:xfrm>
             <a:off x="0" y="0"/>
-            <a:ext cx="10076040" cy="1561320"/>
+            <a:ext cx="10075680" cy="1560960"/>
           </a:xfrm>
           <a:prstGeom prst="rect">
             <a:avLst/>
@@ -13273,7 +13303,7 @@
         <p:spPr>
           <a:xfrm>
             <a:off x="502920" y="2272680"/>
-            <a:ext cx="9065520" cy="4383000"/>
+            <a:ext cx="9065160" cy="4382640"/>
           </a:xfrm>
           <a:prstGeom prst="rect">
             <a:avLst/>
@@ -13299,7 +13329,7 @@
         <p:spPr>
           <a:xfrm>
             <a:off x="365760" y="1926000"/>
-            <a:ext cx="9326520" cy="4017600"/>
+            <a:ext cx="9326160" cy="4017240"/>
           </a:xfrm>
           <a:prstGeom prst="rect">
             <a:avLst/>
@@ -13331,6 +13361,7 @@
                   <a:srgbClr val="f6343f"/>
                 </a:solidFill>
                 <a:latin typeface="Noto Mono"/>
+                <a:ea typeface="DejaVu Sans"/>
               </a:rPr>
               <a:t>processingEnv</a:t>
             </a:r>
@@ -13350,6 +13381,7 @@
                   <a:srgbClr val="f6343f"/>
                 </a:solidFill>
                 <a:latin typeface="Noto Mono"/>
+                <a:ea typeface="DejaVu Sans"/>
               </a:rPr>
               <a:t>  </a:t>
             </a:r>
@@ -13359,6 +13391,7 @@
                   <a:srgbClr val="f6343f"/>
                 </a:solidFill>
                 <a:latin typeface="Noto Mono"/>
+                <a:ea typeface="DejaVu Sans"/>
               </a:rPr>
               <a:t>.getFiler()</a:t>
             </a:r>
@@ -13378,6 +13411,7 @@
                   <a:srgbClr val="f6343f"/>
                 </a:solidFill>
                 <a:latin typeface="Noto Mono"/>
+                <a:ea typeface="DejaVu Sans"/>
               </a:rPr>
               <a:t>  </a:t>
             </a:r>
@@ -13387,6 +13421,7 @@
                   <a:srgbClr val="f6343f"/>
                 </a:solidFill>
                 <a:latin typeface="Noto Mono"/>
+                <a:ea typeface="DejaVu Sans"/>
               </a:rPr>
               <a:t>.createResource(</a:t>
             </a:r>
@@ -13406,6 +13441,7 @@
                   <a:srgbClr val="f6343f"/>
                 </a:solidFill>
                 <a:latin typeface="Noto Mono"/>
+                <a:ea typeface="DejaVu Sans"/>
               </a:rPr>
               <a:t>    </a:t>
             </a:r>
@@ -13415,6 +13451,7 @@
                   <a:srgbClr val="f6343f"/>
                 </a:solidFill>
                 <a:latin typeface="Noto Mono"/>
+                <a:ea typeface="DejaVu Sans"/>
               </a:rPr>
               <a:t>StandardLocation.CLASS_OUTPUT, </a:t>
             </a:r>
@@ -13444,6 +13481,7 @@
                   <a:srgbClr val="f6343f"/>
                 </a:solidFill>
                 <a:latin typeface="Noto Mono"/>
+                <a:ea typeface="DejaVu Sans"/>
               </a:rPr>
               <a:t>""</a:t>
             </a:r>
@@ -13453,6 +13491,7 @@
                   <a:srgbClr val="f6343f"/>
                 </a:solidFill>
                 <a:latin typeface="Noto Mono"/>
+                <a:ea typeface="DejaVu Sans"/>
               </a:rPr>
               <a:t>,</a:t>
             </a:r>
@@ -13482,6 +13521,7 @@
                   <a:srgbClr val="f6343f"/>
                 </a:solidFill>
                 <a:latin typeface="Noto Mono"/>
+                <a:ea typeface="DejaVu Sans"/>
               </a:rPr>
               <a:t>"writable.res"</a:t>
             </a:r>
@@ -13501,6 +13541,7 @@
                   <a:srgbClr val="f6343f"/>
                 </a:solidFill>
                 <a:latin typeface="Noto Mono"/>
+                <a:ea typeface="DejaVu Sans"/>
               </a:rPr>
               <a:t>  </a:t>
             </a:r>
@@ -13510,6 +13551,7 @@
                   <a:srgbClr val="f6343f"/>
                 </a:solidFill>
                 <a:latin typeface="Noto Mono"/>
+                <a:ea typeface="DejaVu Sans"/>
               </a:rPr>
               <a:t>)</a:t>
             </a:r>
@@ -13529,6 +13571,7 @@
                   <a:srgbClr val="f6343f"/>
                 </a:solidFill>
                 <a:latin typeface="Noto Mono"/>
+                <a:ea typeface="DejaVu Sans"/>
               </a:rPr>
               <a:t>  </a:t>
             </a:r>
@@ -13538,6 +13581,7 @@
                   <a:srgbClr val="f6343f"/>
                 </a:solidFill>
                 <a:latin typeface="Noto Mono"/>
+                <a:ea typeface="DejaVu Sans"/>
               </a:rPr>
               <a:t>.openWriter()</a:t>
             </a:r>
@@ -13557,6 +13601,7 @@
                   <a:srgbClr val="f6343f"/>
                 </a:solidFill>
                 <a:latin typeface="Noto Mono"/>
+                <a:ea typeface="DejaVu Sans"/>
               </a:rPr>
               <a:t>  </a:t>
             </a:r>
@@ -13566,6 +13611,7 @@
                   <a:srgbClr val="f6343f"/>
                 </a:solidFill>
                 <a:latin typeface="Noto Mono"/>
+                <a:ea typeface="DejaVu Sans"/>
               </a:rPr>
               <a:t>.append("Hey there!");</a:t>
             </a:r>
@@ -13648,7 +13694,7 @@
         <p:spPr>
           <a:xfrm>
             <a:off x="1278720" y="300600"/>
-            <a:ext cx="8289720" cy="6921000"/>
+            <a:ext cx="8289360" cy="6920640"/>
           </a:xfrm>
           <a:prstGeom prst="rect">
             <a:avLst/>
@@ -13871,7 +13917,7 @@
         <p:spPr>
           <a:xfrm>
             <a:off x="0" y="0"/>
-            <a:ext cx="10076040" cy="1561320"/>
+            <a:ext cx="10075680" cy="1560960"/>
           </a:xfrm>
           <a:prstGeom prst="rect">
             <a:avLst/>
@@ -13922,7 +13968,7 @@
         <p:spPr>
           <a:xfrm>
             <a:off x="502920" y="2272680"/>
-            <a:ext cx="9065520" cy="4383000"/>
+            <a:ext cx="9065160" cy="4382640"/>
           </a:xfrm>
           <a:prstGeom prst="rect">
             <a:avLst/>
@@ -13952,7 +13998,7 @@
         <p:spPr>
           <a:xfrm>
             <a:off x="2569680" y="2323440"/>
-            <a:ext cx="4937760" cy="4254480"/>
+            <a:ext cx="4937400" cy="4254120"/>
           </a:xfrm>
           <a:prstGeom prst="rect">
             <a:avLst/>
@@ -14035,7 +14081,7 @@
         <p:spPr>
           <a:xfrm>
             <a:off x="502920" y="300600"/>
-            <a:ext cx="9065520" cy="6921000"/>
+            <a:ext cx="9065160" cy="6920640"/>
           </a:xfrm>
           <a:prstGeom prst="rect">
             <a:avLst/>
@@ -14148,7 +14194,7 @@
         <p:spPr>
           <a:xfrm>
             <a:off x="0" y="0"/>
-            <a:ext cx="10076040" cy="1561320"/>
+            <a:ext cx="10075680" cy="1560960"/>
           </a:xfrm>
           <a:prstGeom prst="rect">
             <a:avLst/>
@@ -14199,7 +14245,7 @@
         <p:spPr>
           <a:xfrm>
             <a:off x="502920" y="2272680"/>
-            <a:ext cx="9065520" cy="4383000"/>
+            <a:ext cx="9065160" cy="4382640"/>
           </a:xfrm>
           <a:prstGeom prst="rect">
             <a:avLst/>
@@ -14312,7 +14358,7 @@
         <p:spPr>
           <a:xfrm>
             <a:off x="0" y="0"/>
-            <a:ext cx="10076040" cy="1561320"/>
+            <a:ext cx="10075680" cy="1560960"/>
           </a:xfrm>
           <a:prstGeom prst="rect">
             <a:avLst/>
@@ -14363,7 +14409,7 @@
         <p:spPr>
           <a:xfrm>
             <a:off x="502920" y="2272680"/>
-            <a:ext cx="9065520" cy="4383000"/>
+            <a:ext cx="9065160" cy="4382640"/>
           </a:xfrm>
           <a:prstGeom prst="rect">
             <a:avLst/>
@@ -14476,7 +14522,7 @@
         <p:spPr>
           <a:xfrm>
             <a:off x="0" y="0"/>
-            <a:ext cx="10076040" cy="1561320"/>
+            <a:ext cx="10075680" cy="1560960"/>
           </a:xfrm>
           <a:prstGeom prst="rect">
             <a:avLst/>
@@ -14527,7 +14573,7 @@
         <p:spPr>
           <a:xfrm>
             <a:off x="502920" y="2272680"/>
-            <a:ext cx="9065520" cy="4383000"/>
+            <a:ext cx="9065160" cy="4382640"/>
           </a:xfrm>
           <a:prstGeom prst="rect">
             <a:avLst/>
@@ -14553,7 +14599,7 @@
         <p:spPr>
           <a:xfrm>
             <a:off x="365760" y="1926000"/>
-            <a:ext cx="9326520" cy="3419280"/>
+            <a:ext cx="9326160" cy="3418920"/>
           </a:xfrm>
           <a:prstGeom prst="rect">
             <a:avLst/>
@@ -14585,6 +14631,7 @@
                   <a:srgbClr val="f6343f"/>
                 </a:solidFill>
                 <a:latin typeface="Noto Mono"/>
+                <a:ea typeface="DejaVu Sans"/>
               </a:rPr>
               <a:t>processingEnv</a:t>
             </a:r>
@@ -14604,6 +14651,7 @@
                   <a:srgbClr val="f6343f"/>
                 </a:solidFill>
                 <a:latin typeface="Noto Mono"/>
+                <a:ea typeface="DejaVu Sans"/>
               </a:rPr>
               <a:t>  </a:t>
             </a:r>
@@ -14613,6 +14661,7 @@
                   <a:srgbClr val="f6343f"/>
                 </a:solidFill>
                 <a:latin typeface="Noto Mono"/>
+                <a:ea typeface="DejaVu Sans"/>
               </a:rPr>
               <a:t>.getFiler()</a:t>
             </a:r>
@@ -14632,6 +14681,7 @@
                   <a:srgbClr val="f6343f"/>
                 </a:solidFill>
                 <a:latin typeface="Noto Mono"/>
+                <a:ea typeface="DejaVu Sans"/>
               </a:rPr>
               <a:t>  </a:t>
             </a:r>
@@ -14641,6 +14691,7 @@
                   <a:srgbClr val="f6343f"/>
                 </a:solidFill>
                 <a:latin typeface="Noto Mono"/>
+                <a:ea typeface="DejaVu Sans"/>
               </a:rPr>
               <a:t>.getResource(</a:t>
             </a:r>
@@ -14660,6 +14711,7 @@
                   <a:srgbClr val="f6343f"/>
                 </a:solidFill>
                 <a:latin typeface="Noto Mono"/>
+                <a:ea typeface="DejaVu Sans"/>
               </a:rPr>
               <a:t>    </a:t>
             </a:r>
@@ -14669,6 +14721,7 @@
                   <a:srgbClr val="f6343f"/>
                 </a:solidFill>
                 <a:latin typeface="Noto Mono"/>
+                <a:ea typeface="DejaVu Sans"/>
               </a:rPr>
               <a:t>location, </a:t>
             </a:r>
@@ -14688,6 +14741,7 @@
                   <a:srgbClr val="f6343f"/>
                 </a:solidFill>
                 <a:latin typeface="Noto Mono"/>
+                <a:ea typeface="DejaVu Sans"/>
               </a:rPr>
               <a:t>    </a:t>
             </a:r>
@@ -14697,6 +14751,7 @@
                   <a:srgbClr val="f6343f"/>
                 </a:solidFill>
                 <a:latin typeface="Noto Mono"/>
+                <a:ea typeface="DejaVu Sans"/>
               </a:rPr>
               <a:t>pkg,</a:t>
             </a:r>
@@ -14716,6 +14771,7 @@
                   <a:srgbClr val="f6343f"/>
                 </a:solidFill>
                 <a:latin typeface="Noto Mono"/>
+                <a:ea typeface="DejaVu Sans"/>
               </a:rPr>
               <a:t>    </a:t>
             </a:r>
@@ -14725,6 +14781,7 @@
                   <a:srgbClr val="f6343f"/>
                 </a:solidFill>
                 <a:latin typeface="Noto Mono"/>
+                <a:ea typeface="DejaVu Sans"/>
               </a:rPr>
               <a:t>relativeName</a:t>
             </a:r>
@@ -14744,6 +14801,7 @@
                   <a:srgbClr val="f6343f"/>
                 </a:solidFill>
                 <a:latin typeface="Noto Mono"/>
+                <a:ea typeface="DejaVu Sans"/>
               </a:rPr>
               <a:t>  </a:t>
             </a:r>
@@ -14753,6 +14811,7 @@
                   <a:srgbClr val="f6343f"/>
                 </a:solidFill>
                 <a:latin typeface="Noto Mono"/>
+                <a:ea typeface="DejaVu Sans"/>
               </a:rPr>
               <a:t>)</a:t>
             </a:r>
@@ -14772,6 +14831,7 @@
                   <a:srgbClr val="f6343f"/>
                 </a:solidFill>
                 <a:latin typeface="Noto Mono"/>
+                <a:ea typeface="DejaVu Sans"/>
               </a:rPr>
               <a:t>  </a:t>
             </a:r>
@@ -14781,6 +14841,7 @@
                   <a:srgbClr val="f6343f"/>
                 </a:solidFill>
                 <a:latin typeface="Noto Mono"/>
+                <a:ea typeface="DejaVu Sans"/>
               </a:rPr>
               <a:t>.openReader();</a:t>
             </a:r>
@@ -14792,14 +14853,14 @@
       </p:sp>
       <p:sp>
         <p:nvSpPr>
-          <p:cNvPr id="240" name="TextShape 4"/>
-          <p:cNvSpPr txBox="1"/>
+          <p:cNvPr id="240" name="CustomShape 4"/>
+          <p:cNvSpPr/>
           <p:nvPr/>
         </p:nvSpPr>
         <p:spPr>
           <a:xfrm>
             <a:off x="375120" y="5708160"/>
-            <a:ext cx="9326880" cy="1129680"/>
+            <a:ext cx="9326520" cy="1129320"/>
           </a:xfrm>
           <a:prstGeom prst="rect">
             <a:avLst/>
@@ -14809,10 +14870,20 @@
             <a:noFill/>
           </a:ln>
         </p:spPr>
+        <p:style>
+          <a:lnRef idx="0"/>
+          <a:fillRef idx="0"/>
+          <a:effectRef idx="0"/>
+          <a:fontRef idx="minor"/>
+        </p:style>
         <p:txBody>
           <a:bodyPr lIns="90000" rIns="90000" tIns="45000" bIns="45000"/>
           <a:p>
-            <a:pPr algn="ctr"/>
+            <a:pPr algn="ctr">
+              <a:lnSpc>
+                <a:spcPct val="100000"/>
+              </a:lnSpc>
+            </a:pPr>
             <a:r>
               <a:rPr b="0" lang="en-US" sz="6000" spc="-1" strike="noStrike">
                 <a:solidFill>
@@ -14823,10 +14894,7 @@
               <a:t>???</a:t>
             </a:r>
             <a:endParaRPr b="0" lang="en-US" sz="6000" spc="-1" strike="noStrike">
-              <a:solidFill>
-                <a:srgbClr val="f6343f"/>
-              </a:solidFill>
-              <a:latin typeface="Noto Sans"/>
+              <a:latin typeface="Arial"/>
             </a:endParaRPr>
           </a:p>
         </p:txBody>
@@ -14904,7 +14972,7 @@
         <p:spPr>
           <a:xfrm>
             <a:off x="0" y="0"/>
-            <a:ext cx="10076040" cy="1561320"/>
+            <a:ext cx="10075680" cy="1560960"/>
           </a:xfrm>
           <a:prstGeom prst="rect">
             <a:avLst/>
@@ -14955,7 +15023,7 @@
         <p:spPr>
           <a:xfrm>
             <a:off x="502920" y="2272680"/>
-            <a:ext cx="9065520" cy="4383000"/>
+            <a:ext cx="9065160" cy="4382640"/>
           </a:xfrm>
           <a:prstGeom prst="rect">
             <a:avLst/>
@@ -15068,7 +15136,7 @@
         <p:spPr>
           <a:xfrm>
             <a:off x="502920" y="300600"/>
-            <a:ext cx="9065520" cy="6921000"/>
+            <a:ext cx="9065160" cy="6920640"/>
           </a:xfrm>
           <a:prstGeom prst="rect">
             <a:avLst/>
@@ -15181,7 +15249,7 @@
         <p:spPr>
           <a:xfrm>
             <a:off x="0" y="0"/>
-            <a:ext cx="10076040" cy="1561320"/>
+            <a:ext cx="10075680" cy="1560960"/>
           </a:xfrm>
           <a:prstGeom prst="rect">
             <a:avLst/>
@@ -15232,7 +15300,7 @@
         <p:spPr>
           <a:xfrm>
             <a:off x="502920" y="2272680"/>
-            <a:ext cx="9065520" cy="4383000"/>
+            <a:ext cx="9065160" cy="4382640"/>
           </a:xfrm>
           <a:prstGeom prst="rect">
             <a:avLst/>
@@ -15345,7 +15413,7 @@
         <p:spPr>
           <a:xfrm>
             <a:off x="0" y="0"/>
-            <a:ext cx="10076040" cy="1561320"/>
+            <a:ext cx="10075680" cy="1560960"/>
           </a:xfrm>
           <a:prstGeom prst="rect">
             <a:avLst/>
@@ -15396,7 +15464,7 @@
         <p:spPr>
           <a:xfrm>
             <a:off x="502920" y="2272680"/>
-            <a:ext cx="9065520" cy="4383000"/>
+            <a:ext cx="9065160" cy="4382640"/>
           </a:xfrm>
           <a:prstGeom prst="rect">
             <a:avLst/>
@@ -15422,7 +15490,7 @@
         <p:spPr>
           <a:xfrm>
             <a:off x="365760" y="2474640"/>
-            <a:ext cx="9326520" cy="3186000"/>
+            <a:ext cx="9326160" cy="3185640"/>
           </a:xfrm>
           <a:prstGeom prst="rect">
             <a:avLst/>
@@ -15454,6 +15522,7 @@
                   <a:srgbClr val="f6343f"/>
                 </a:solidFill>
                 <a:latin typeface="Noto Mono"/>
+                <a:ea typeface="DejaVu Sans"/>
               </a:rPr>
               <a:t>processingEnv</a:t>
             </a:r>
@@ -15473,6 +15542,7 @@
                   <a:srgbClr val="f6343f"/>
                 </a:solidFill>
                 <a:latin typeface="Noto Mono"/>
+                <a:ea typeface="DejaVu Sans"/>
               </a:rPr>
               <a:t>  </a:t>
             </a:r>
@@ -15482,6 +15552,7 @@
                   <a:srgbClr val="f6343f"/>
                 </a:solidFill>
                 <a:latin typeface="Noto Mono"/>
+                <a:ea typeface="DejaVu Sans"/>
               </a:rPr>
               <a:t>.getMessager()</a:t>
             </a:r>
@@ -15501,6 +15572,7 @@
                   <a:srgbClr val="f6343f"/>
                 </a:solidFill>
                 <a:latin typeface="Noto Mono"/>
+                <a:ea typeface="DejaVu Sans"/>
               </a:rPr>
               <a:t>  </a:t>
             </a:r>
@@ -15510,6 +15582,7 @@
                   <a:srgbClr val="f6343f"/>
                 </a:solidFill>
                 <a:latin typeface="Noto Mono"/>
+                <a:ea typeface="DejaVu Sans"/>
               </a:rPr>
               <a:t>.printMessage(</a:t>
             </a:r>
@@ -15529,6 +15602,7 @@
                   <a:srgbClr val="f6343f"/>
                 </a:solidFill>
                 <a:latin typeface="Noto Mono"/>
+                <a:ea typeface="DejaVu Sans"/>
               </a:rPr>
               <a:t>    </a:t>
             </a:r>
@@ -15538,6 +15612,7 @@
                   <a:srgbClr val="f6343f"/>
                 </a:solidFill>
                 <a:latin typeface="Noto Mono"/>
+                <a:ea typeface="DejaVu Sans"/>
               </a:rPr>
               <a:t>Diagnostic.Kind.NOTE, </a:t>
             </a:r>
@@ -15557,6 +15632,7 @@
                   <a:srgbClr val="f6343f"/>
                 </a:solidFill>
                 <a:latin typeface="Noto Mono"/>
+                <a:ea typeface="DejaVu Sans"/>
               </a:rPr>
               <a:t>    </a:t>
             </a:r>
@@ -15566,6 +15642,7 @@
                   <a:srgbClr val="f6343f"/>
                 </a:solidFill>
                 <a:latin typeface="Noto Mono"/>
+                <a:ea typeface="DejaVu Sans"/>
               </a:rPr>
               <a:t>"Look what i've found!", </a:t>
             </a:r>
@@ -15585,6 +15662,7 @@
                   <a:srgbClr val="f6343f"/>
                 </a:solidFill>
                 <a:latin typeface="Noto Mono"/>
+                <a:ea typeface="DejaVu Sans"/>
               </a:rPr>
               <a:t>    </a:t>
             </a:r>
@@ -15594,6 +15672,7 @@
                   <a:srgbClr val="f6343f"/>
                 </a:solidFill>
                 <a:latin typeface="Noto Mono"/>
+                <a:ea typeface="DejaVu Sans"/>
               </a:rPr>
               <a:t>element</a:t>
             </a:r>
@@ -15613,6 +15692,7 @@
                   <a:srgbClr val="f6343f"/>
                 </a:solidFill>
                 <a:latin typeface="Noto Mono"/>
+                <a:ea typeface="DejaVu Sans"/>
               </a:rPr>
               <a:t>  </a:t>
             </a:r>
@@ -15622,6 +15702,7 @@
                   <a:srgbClr val="f6343f"/>
                 </a:solidFill>
                 <a:latin typeface="Noto Mono"/>
+                <a:ea typeface="DejaVu Sans"/>
               </a:rPr>
               <a:t>);</a:t>
             </a:r>
@@ -15704,7 +15785,7 @@
         <p:spPr>
           <a:xfrm>
             <a:off x="0" y="0"/>
-            <a:ext cx="10076040" cy="1561320"/>
+            <a:ext cx="10075680" cy="1560960"/>
           </a:xfrm>
           <a:prstGeom prst="rect">
             <a:avLst/>
@@ -15755,7 +15836,7 @@
         <p:spPr>
           <a:xfrm>
             <a:off x="502920" y="2272680"/>
-            <a:ext cx="9065520" cy="4383000"/>
+            <a:ext cx="9065160" cy="4382640"/>
           </a:xfrm>
           <a:prstGeom prst="rect">
             <a:avLst/>
@@ -15781,7 +15862,7 @@
         <p:spPr>
           <a:xfrm>
             <a:off x="365760" y="3261960"/>
-            <a:ext cx="9326520" cy="1584000"/>
+            <a:ext cx="9326160" cy="1583640"/>
           </a:xfrm>
           <a:prstGeom prst="rect">
             <a:avLst/>
@@ -15813,6 +15894,7 @@
                   <a:srgbClr val="f6343f"/>
                 </a:solidFill>
                 <a:latin typeface="Noto Mono"/>
+                <a:ea typeface="DejaVu Sans"/>
               </a:rPr>
               <a:t>...Note: Look what i've found!</a:t>
             </a:r>
@@ -15832,6 +15914,7 @@
                   <a:srgbClr val="f6343f"/>
                 </a:solidFill>
                 <a:latin typeface="Noto Mono"/>
+                <a:ea typeface="DejaVu Sans"/>
               </a:rPr>
               <a:t>public class Entrypoint {</a:t>
             </a:r>
@@ -15851,6 +15934,7 @@
                   <a:srgbClr val="f6343f"/>
                 </a:solidFill>
                 <a:latin typeface="Noto Mono"/>
+                <a:ea typeface="DejaVu Sans"/>
               </a:rPr>
               <a:t>       </a:t>
             </a:r>
@@ -15860,6 +15944,7 @@
                   <a:srgbClr val="f6343f"/>
                 </a:solidFill>
                 <a:latin typeface="Noto Mono"/>
+                <a:ea typeface="DejaVu Sans"/>
               </a:rPr>
               <a:t>^</a:t>
             </a:r>
@@ -15942,7 +16027,7 @@
         <p:spPr>
           <a:xfrm>
             <a:off x="502920" y="300600"/>
-            <a:ext cx="9065520" cy="6921000"/>
+            <a:ext cx="9065160" cy="6920640"/>
           </a:xfrm>
           <a:prstGeom prst="rect">
             <a:avLst/>
@@ -16055,7 +16140,7 @@
         <p:spPr>
           <a:xfrm>
             <a:off x="0" y="0"/>
-            <a:ext cx="10076040" cy="1561320"/>
+            <a:ext cx="10075680" cy="1560960"/>
           </a:xfrm>
           <a:prstGeom prst="rect">
             <a:avLst/>
@@ -16106,7 +16191,7 @@
         <p:spPr>
           <a:xfrm>
             <a:off x="502920" y="2272680"/>
-            <a:ext cx="9065520" cy="4383000"/>
+            <a:ext cx="9065160" cy="4382640"/>
           </a:xfrm>
           <a:prstGeom prst="rect">
             <a:avLst/>
@@ -16219,7 +16304,7 @@
         <p:spPr>
           <a:xfrm>
             <a:off x="502920" y="300600"/>
-            <a:ext cx="9065520" cy="6921000"/>
+            <a:ext cx="9065160" cy="6920640"/>
           </a:xfrm>
           <a:prstGeom prst="rect">
             <a:avLst/>
@@ -16332,7 +16417,7 @@
         <p:spPr>
           <a:xfrm>
             <a:off x="0" y="0"/>
-            <a:ext cx="10076040" cy="1561320"/>
+            <a:ext cx="10075680" cy="1560960"/>
           </a:xfrm>
           <a:prstGeom prst="rect">
             <a:avLst/>
@@ -16383,7 +16468,7 @@
         <p:spPr>
           <a:xfrm>
             <a:off x="502920" y="2272680"/>
-            <a:ext cx="9065520" cy="4383000"/>
+            <a:ext cx="9065160" cy="4382640"/>
           </a:xfrm>
           <a:prstGeom prst="rect">
             <a:avLst/>
@@ -16496,7 +16581,7 @@
         <p:spPr>
           <a:xfrm>
             <a:off x="0" y="0"/>
-            <a:ext cx="10076040" cy="1561320"/>
+            <a:ext cx="10075680" cy="1560960"/>
           </a:xfrm>
           <a:prstGeom prst="rect">
             <a:avLst/>
@@ -16547,7 +16632,7 @@
         <p:spPr>
           <a:xfrm>
             <a:off x="535320" y="3566160"/>
-            <a:ext cx="9006480" cy="1754640"/>
+            <a:ext cx="9006120" cy="1754280"/>
           </a:xfrm>
           <a:prstGeom prst="rect">
             <a:avLst/>
@@ -16752,7 +16837,7 @@
         <p:spPr>
           <a:xfrm>
             <a:off x="0" y="0"/>
-            <a:ext cx="10076040" cy="1561320"/>
+            <a:ext cx="10075680" cy="1560960"/>
           </a:xfrm>
           <a:prstGeom prst="rect">
             <a:avLst/>
@@ -16803,7 +16888,7 @@
         <p:spPr>
           <a:xfrm>
             <a:off x="505800" y="2231640"/>
-            <a:ext cx="9065520" cy="1317960"/>
+            <a:ext cx="9065160" cy="1317600"/>
           </a:xfrm>
           <a:prstGeom prst="rect">
             <a:avLst/>
@@ -16852,7 +16937,7 @@
         <p:spPr>
           <a:xfrm>
             <a:off x="535320" y="4004280"/>
-            <a:ext cx="9006480" cy="1554120"/>
+            <a:ext cx="9006120" cy="1553760"/>
           </a:xfrm>
           <a:prstGeom prst="rect">
             <a:avLst/>
@@ -17027,7 +17112,7 @@
         <p:spPr>
           <a:xfrm>
             <a:off x="0" y="0"/>
-            <a:ext cx="10076040" cy="1561320"/>
+            <a:ext cx="10075680" cy="1560960"/>
           </a:xfrm>
           <a:prstGeom prst="rect">
             <a:avLst/>
@@ -17078,7 +17163,7 @@
         <p:spPr>
           <a:xfrm>
             <a:off x="502920" y="2272680"/>
-            <a:ext cx="9065520" cy="4383000"/>
+            <a:ext cx="9065160" cy="4382640"/>
           </a:xfrm>
           <a:prstGeom prst="rect">
             <a:avLst/>
@@ -17221,7 +17306,7 @@
         <p:spPr>
           <a:xfrm>
             <a:off x="502920" y="300600"/>
-            <a:ext cx="9065520" cy="6921000"/>
+            <a:ext cx="9065160" cy="6920640"/>
           </a:xfrm>
           <a:prstGeom prst="rect">
             <a:avLst/>
@@ -17364,7 +17449,7 @@
         <p:spPr>
           <a:xfrm>
             <a:off x="502920" y="300600"/>
-            <a:ext cx="9065520" cy="6921000"/>
+            <a:ext cx="9065160" cy="6920640"/>
           </a:xfrm>
           <a:prstGeom prst="rect">
             <a:avLst/>
@@ -17477,7 +17562,7 @@
         <p:spPr>
           <a:xfrm>
             <a:off x="502920" y="300600"/>
-            <a:ext cx="9065520" cy="6921000"/>
+            <a:ext cx="9065160" cy="6920640"/>
           </a:xfrm>
           <a:prstGeom prst="rect">
             <a:avLst/>
@@ -17590,7 +17675,7 @@
         <p:spPr>
           <a:xfrm>
             <a:off x="502920" y="300600"/>
-            <a:ext cx="9065520" cy="6921000"/>
+            <a:ext cx="9065160" cy="6920640"/>
           </a:xfrm>
           <a:prstGeom prst="rect">
             <a:avLst/>
@@ -17727,7 +17812,7 @@
         <p:spPr>
           <a:xfrm>
             <a:off x="1843560" y="3348360"/>
-            <a:ext cx="6389640" cy="865800"/>
+            <a:ext cx="6389280" cy="865440"/>
           </a:xfrm>
           <a:prstGeom prst="rect">
             <a:avLst/>
@@ -17810,7 +17895,7 @@
         <p:spPr>
           <a:xfrm>
             <a:off x="0" y="0"/>
-            <a:ext cx="10076040" cy="1561320"/>
+            <a:ext cx="10075680" cy="1560960"/>
           </a:xfrm>
           <a:prstGeom prst="rect">
             <a:avLst/>
@@ -17881,7 +17966,7 @@
         <p:spPr>
           <a:xfrm>
             <a:off x="502920" y="1768680"/>
-            <a:ext cx="9065520" cy="4383000"/>
+            <a:ext cx="9065160" cy="4382640"/>
           </a:xfrm>
           <a:prstGeom prst="rect">
             <a:avLst/>
@@ -17911,7 +17996,7 @@
         <p:spPr>
           <a:xfrm>
             <a:off x="1303920" y="3771360"/>
-            <a:ext cx="7504200" cy="828000"/>
+            <a:ext cx="7503840" cy="827640"/>
           </a:xfrm>
           <a:prstGeom prst="rect">
             <a:avLst/>
@@ -17934,7 +18019,7 @@
         <p:spPr>
           <a:xfrm>
             <a:off x="365760" y="3447360"/>
-            <a:ext cx="9363240" cy="1033200"/>
+            <a:ext cx="9362880" cy="1032840"/>
           </a:xfrm>
           <a:prstGeom prst="rect">
             <a:avLst/>
@@ -18017,7 +18102,7 @@
         <p:spPr>
           <a:xfrm>
             <a:off x="0" y="0"/>
-            <a:ext cx="10076040" cy="1561320"/>
+            <a:ext cx="10075680" cy="1560960"/>
           </a:xfrm>
           <a:prstGeom prst="rect">
             <a:avLst/>
@@ -18088,7 +18173,7 @@
         <p:spPr>
           <a:xfrm>
             <a:off x="502920" y="1768680"/>
-            <a:ext cx="9065520" cy="4383000"/>
+            <a:ext cx="9065160" cy="4382640"/>
           </a:xfrm>
           <a:prstGeom prst="rect">
             <a:avLst/>
@@ -18118,7 +18203,7 @@
         <p:spPr>
           <a:xfrm>
             <a:off x="365760" y="3447000"/>
-            <a:ext cx="9363240" cy="1033200"/>
+            <a:ext cx="9362880" cy="1032840"/>
           </a:xfrm>
           <a:prstGeom prst="rect">
             <a:avLst/>
@@ -18137,7 +18222,7 @@
         <p:spPr>
           <a:xfrm>
             <a:off x="1198080" y="4754880"/>
-            <a:ext cx="7680600" cy="1056240"/>
+            <a:ext cx="7680240" cy="1055880"/>
           </a:xfrm>
           <a:prstGeom prst="rect">
             <a:avLst/>
@@ -18167,6 +18252,7 @@
                   <a:srgbClr val="f6343f"/>
                 </a:solidFill>
                 <a:latin typeface="Noto Sans"/>
+                <a:ea typeface="DejaVu Sans"/>
               </a:rPr>
               <a:t>Да будь же ты человеком, он же еще не родился!</a:t>
             </a:r>
@@ -18249,7 +18335,7 @@
         <p:spPr>
           <a:xfrm>
             <a:off x="0" y="0"/>
-            <a:ext cx="10076040" cy="1561320"/>
+            <a:ext cx="10075680" cy="1560960"/>
           </a:xfrm>
           <a:prstGeom prst="rect">
             <a:avLst/>
@@ -18320,7 +18406,7 @@
         <p:spPr>
           <a:xfrm>
             <a:off x="502920" y="1768680"/>
-            <a:ext cx="9065520" cy="4383000"/>
+            <a:ext cx="9065160" cy="4382640"/>
           </a:xfrm>
           <a:prstGeom prst="rect">
             <a:avLst/>
@@ -18350,7 +18436,7 @@
         <p:spPr>
           <a:xfrm>
             <a:off x="0" y="1561320"/>
-            <a:ext cx="10077480" cy="6001560"/>
+            <a:ext cx="10077120" cy="6001200"/>
           </a:xfrm>
           <a:prstGeom prst="rect">
             <a:avLst/>
@@ -18362,14 +18448,14 @@
       </p:pic>
       <p:sp>
         <p:nvSpPr>
-          <p:cNvPr id="279" name="TextShape 3"/>
-          <p:cNvSpPr txBox="1"/>
+          <p:cNvPr id="279" name="CustomShape 3"/>
+          <p:cNvSpPr/>
           <p:nvPr/>
         </p:nvSpPr>
         <p:spPr>
           <a:xfrm>
             <a:off x="2345760" y="6675120"/>
-            <a:ext cx="5385600" cy="678240"/>
+            <a:ext cx="5385240" cy="677880"/>
           </a:xfrm>
           <a:prstGeom prst="rect">
             <a:avLst/>
@@ -18381,10 +18467,20 @@
             <a:noFill/>
           </a:ln>
         </p:spPr>
+        <p:style>
+          <a:lnRef idx="0"/>
+          <a:fillRef idx="0"/>
+          <a:effectRef idx="0"/>
+          <a:fontRef idx="minor"/>
+        </p:style>
         <p:txBody>
           <a:bodyPr lIns="90000" rIns="90000" tIns="45000" bIns="45000"/>
           <a:p>
-            <a:pPr algn="ctr"/>
+            <a:pPr algn="ctr">
+              <a:lnSpc>
+                <a:spcPct val="100000"/>
+              </a:lnSpc>
+            </a:pPr>
             <a:r>
               <a:rPr b="1" lang="en-US" sz="3200" spc="-1" strike="noStrike">
                 <a:solidFill>
@@ -18394,11 +18490,8 @@
               </a:rPr>
               <a:t>Куда же он пропал...</a:t>
             </a:r>
-            <a:endParaRPr b="1" lang="en-US" sz="3200" spc="-1" strike="noStrike">
-              <a:solidFill>
-                <a:srgbClr val="ffffff"/>
-              </a:solidFill>
-              <a:latin typeface="Noto Sans"/>
+            <a:endParaRPr b="0" lang="en-US" sz="3200" spc="-1" strike="noStrike">
+              <a:latin typeface="Arial"/>
             </a:endParaRPr>
           </a:p>
         </p:txBody>
@@ -18480,7 +18573,7 @@
         <p:spPr>
           <a:xfrm>
             <a:off x="365760" y="3447360"/>
-            <a:ext cx="9363240" cy="1033200"/>
+            <a:ext cx="9362880" cy="1032840"/>
           </a:xfrm>
           <a:prstGeom prst="rect">
             <a:avLst/>
@@ -18499,7 +18592,7 @@
         <p:spPr>
           <a:xfrm>
             <a:off x="0" y="0"/>
-            <a:ext cx="10076040" cy="1561320"/>
+            <a:ext cx="10075680" cy="1560960"/>
           </a:xfrm>
           <a:prstGeom prst="rect">
             <a:avLst/>
@@ -18570,7 +18663,7 @@
         <p:spPr>
           <a:xfrm>
             <a:off x="502920" y="1768680"/>
-            <a:ext cx="9065520" cy="4383000"/>
+            <a:ext cx="9065160" cy="4382640"/>
           </a:xfrm>
           <a:prstGeom prst="rect">
             <a:avLst/>
@@ -18652,7 +18745,7 @@
         <p:spPr>
           <a:xfrm>
             <a:off x="1198080" y="4755240"/>
-            <a:ext cx="7680600" cy="1056240"/>
+            <a:ext cx="7680240" cy="1055880"/>
           </a:xfrm>
           <a:prstGeom prst="rect">
             <a:avLst/>
@@ -18682,6 +18775,7 @@
                   <a:srgbClr val="f6343f"/>
                 </a:solidFill>
                 <a:latin typeface="Noto Sans"/>
+                <a:ea typeface="DejaVu Sans"/>
               </a:rPr>
               <a:t>Да будьте ж вы человеком, он же еще не родился!</a:t>
             </a:r>
@@ -18764,7 +18858,7 @@
         <p:spPr>
           <a:xfrm>
             <a:off x="502920" y="300600"/>
-            <a:ext cx="9065520" cy="6921000"/>
+            <a:ext cx="9065160" cy="6920640"/>
           </a:xfrm>
           <a:prstGeom prst="rect">
             <a:avLst/>
@@ -18897,7 +18991,7 @@
         <p:spPr>
           <a:xfrm>
             <a:off x="0" y="0"/>
-            <a:ext cx="10076040" cy="1561320"/>
+            <a:ext cx="10075680" cy="1560960"/>
           </a:xfrm>
           <a:prstGeom prst="rect">
             <a:avLst/>
@@ -18968,7 +19062,7 @@
         <p:spPr>
           <a:xfrm>
             <a:off x="502920" y="1768680"/>
-            <a:ext cx="9065520" cy="4383000"/>
+            <a:ext cx="9065160" cy="4382640"/>
           </a:xfrm>
           <a:prstGeom prst="rect">
             <a:avLst/>
@@ -18994,7 +19088,7 @@
         <p:spPr>
           <a:xfrm>
             <a:off x="548640" y="2743200"/>
-            <a:ext cx="8960760" cy="3003120"/>
+            <a:ext cx="8960400" cy="3002760"/>
           </a:xfrm>
           <a:prstGeom prst="rect">
             <a:avLst/>
@@ -19024,6 +19118,7 @@
                   <a:srgbClr val="f6343f"/>
                 </a:solidFill>
                 <a:latin typeface="Noto Sans"/>
+                <a:ea typeface="DejaVu Sans"/>
               </a:rPr>
               <a:t>- commons.jar</a:t>
             </a:r>
@@ -19043,6 +19138,7 @@
                   <a:srgbClr val="f6343f"/>
                 </a:solidFill>
                 <a:latin typeface="Noto Sans"/>
+                <a:ea typeface="DejaVu Sans"/>
               </a:rPr>
               <a:t>    </a:t>
             </a:r>
@@ -19052,6 +19148,7 @@
                   <a:srgbClr val="f6343f"/>
                 </a:solidFill>
                 <a:latin typeface="Noto Sans"/>
+                <a:ea typeface="DejaVu Sans"/>
               </a:rPr>
               <a:t>- </a:t>
             </a:r>
@@ -19061,6 +19158,7 @@
                   <a:srgbClr val="666666"/>
                 </a:solidFill>
                 <a:latin typeface="Noto Mono"/>
+                <a:ea typeface="DejaVu Sans"/>
               </a:rPr>
               <a:t>@Explosive class Dynamite {}</a:t>
             </a:r>
@@ -19080,6 +19178,7 @@
                   <a:srgbClr val="f6343f"/>
                 </a:solidFill>
                 <a:latin typeface="Noto Sans"/>
+                <a:ea typeface="DejaVu Sans"/>
               </a:rPr>
               <a:t>    </a:t>
             </a:r>
@@ -19089,6 +19188,7 @@
                   <a:srgbClr val="f6343f"/>
                 </a:solidFill>
                 <a:latin typeface="Noto Sans"/>
+                <a:ea typeface="DejaVu Sans"/>
               </a:rPr>
               <a:t>- scope: provided</a:t>
             </a:r>
@@ -19118,6 +19218,7 @@
                   <a:srgbClr val="f6343f"/>
                 </a:solidFill>
                 <a:latin typeface="Noto Sans"/>
+                <a:ea typeface="DejaVu Sans"/>
               </a:rPr>
               <a:t>- fat.jar: </a:t>
             </a:r>
@@ -19127,6 +19228,7 @@
                   <a:srgbClr val="666666"/>
                 </a:solidFill>
                 <a:latin typeface="Noto Mono"/>
+                <a:ea typeface="DejaVu Sans"/>
               </a:rPr>
               <a:t>discover(Explosive.class).map(Class::forName)</a:t>
             </a:r>
@@ -19146,6 +19248,7 @@
                   <a:srgbClr val="f6343f"/>
                 </a:solidFill>
                 <a:latin typeface="Noto Sans"/>
+                <a:ea typeface="DejaVu Sans"/>
               </a:rPr>
               <a:t>    </a:t>
             </a:r>
@@ -19155,6 +19258,7 @@
                   <a:srgbClr val="f6343f"/>
                 </a:solidFill>
                 <a:latin typeface="Noto Sans"/>
+                <a:ea typeface="DejaVu Sans"/>
               </a:rPr>
               <a:t>-  JVM стреляет ClassNotFoundException, потому что</a:t>
             </a:r>
@@ -19174,6 +19278,7 @@
                   <a:srgbClr val="f6343f"/>
                 </a:solidFill>
                 <a:latin typeface="Noto Sans"/>
+                <a:ea typeface="DejaVu Sans"/>
               </a:rPr>
               <a:t>       </a:t>
             </a:r>
@@ -19183,6 +19288,7 @@
                   <a:srgbClr val="f6343f"/>
                 </a:solidFill>
                 <a:latin typeface="Noto Sans"/>
+                <a:ea typeface="DejaVu Sans"/>
               </a:rPr>
               <a:t>класс Dynamite не включен в fat.jar</a:t>
             </a:r>
@@ -19265,7 +19371,7 @@
         <p:spPr>
           <a:xfrm>
             <a:off x="0" y="0"/>
-            <a:ext cx="10076040" cy="1561320"/>
+            <a:ext cx="10075680" cy="1560960"/>
           </a:xfrm>
           <a:prstGeom prst="rect">
             <a:avLst/>
@@ -19336,7 +19442,7 @@
         <p:spPr>
           <a:xfrm>
             <a:off x="502920" y="1768680"/>
-            <a:ext cx="9065520" cy="4383000"/>
+            <a:ext cx="9065160" cy="4382640"/>
           </a:xfrm>
           <a:prstGeom prst="rect">
             <a:avLst/>
@@ -19367,7 +19473,7 @@
         <p:spPr>
           <a:xfrm>
             <a:off x="0" y="1554480"/>
-            <a:ext cx="10077480" cy="6008400"/>
+            <a:ext cx="10077120" cy="6008040"/>
           </a:xfrm>
           <a:prstGeom prst="rect">
             <a:avLst/>
@@ -19379,14 +19485,14 @@
       </p:pic>
       <p:sp>
         <p:nvSpPr>
-          <p:cNvPr id="293" name="TextShape 3"/>
-          <p:cNvSpPr txBox="1"/>
+          <p:cNvPr id="293" name="CustomShape 3"/>
+          <p:cNvSpPr/>
           <p:nvPr/>
         </p:nvSpPr>
         <p:spPr>
           <a:xfrm>
             <a:off x="365760" y="6217920"/>
-            <a:ext cx="5669280" cy="1197000"/>
+            <a:ext cx="5668920" cy="1196640"/>
           </a:xfrm>
           <a:prstGeom prst="rect">
             <a:avLst/>
@@ -19398,10 +19504,20 @@
             <a:noFill/>
           </a:ln>
         </p:spPr>
+        <p:style>
+          <a:lnRef idx="0"/>
+          <a:fillRef idx="0"/>
+          <a:effectRef idx="0"/>
+          <a:fontRef idx="minor"/>
+        </p:style>
         <p:txBody>
           <a:bodyPr lIns="90000" rIns="90000" tIns="45000" bIns="45000"/>
           <a:p>
-            <a:pPr algn="ctr"/>
+            <a:pPr algn="ctr">
+              <a:lnSpc>
+                <a:spcPct val="100000"/>
+              </a:lnSpc>
+            </a:pPr>
             <a:r>
               <a:rPr b="1" lang="en-US" sz="3200" spc="-1" strike="noStrike">
                 <a:solidFill>
@@ -19411,11 +19527,8 @@
               </a:rPr>
               <a:t>Просто ты опять забыл положить меня в JAR (((</a:t>
             </a:r>
-            <a:endParaRPr b="1" lang="en-US" sz="3200" spc="-1" strike="noStrike">
-              <a:solidFill>
-                <a:srgbClr val="ffffff"/>
-              </a:solidFill>
-              <a:latin typeface="Noto Sans"/>
+            <a:endParaRPr b="0" lang="en-US" sz="3200" spc="-1" strike="noStrike">
+              <a:latin typeface="Arial"/>
             </a:endParaRPr>
           </a:p>
         </p:txBody>
@@ -19493,7 +19606,7 @@
         <p:spPr>
           <a:xfrm>
             <a:off x="0" y="0"/>
-            <a:ext cx="10076040" cy="1561320"/>
+            <a:ext cx="10075680" cy="1560960"/>
           </a:xfrm>
           <a:prstGeom prst="rect">
             <a:avLst/>
@@ -19564,7 +19677,7 @@
         <p:spPr>
           <a:xfrm>
             <a:off x="502920" y="1768680"/>
-            <a:ext cx="9065520" cy="4383000"/>
+            <a:ext cx="9065160" cy="4382640"/>
           </a:xfrm>
           <a:prstGeom prst="rect">
             <a:avLst/>
@@ -19590,7 +19703,7 @@
         <p:spPr>
           <a:xfrm>
             <a:off x="502920" y="3187440"/>
-            <a:ext cx="8960760" cy="1888560"/>
+            <a:ext cx="8960400" cy="1888200"/>
           </a:xfrm>
           <a:prstGeom prst="rect">
             <a:avLst/>
@@ -19620,6 +19733,7 @@
                   <a:srgbClr val="f6343f"/>
                 </a:solidFill>
                 <a:latin typeface="Noto Sans"/>
+                <a:ea typeface="DejaVu Sans"/>
               </a:rPr>
               <a:t>Решение: </a:t>
             </a:r>
@@ -19649,6 +19763,7 @@
                   <a:srgbClr val="f6343f"/>
                 </a:solidFill>
                 <a:latin typeface="Noto Sans"/>
+                <a:ea typeface="DejaVu Sans"/>
               </a:rPr>
               <a:t>оперировать только FQCN в виде строк и проверять существование</a:t>
             </a:r>
@@ -19731,7 +19846,7 @@
         <p:spPr>
           <a:xfrm>
             <a:off x="502920" y="300600"/>
-            <a:ext cx="9065520" cy="6921000"/>
+            <a:ext cx="9065160" cy="6920640"/>
           </a:xfrm>
           <a:prstGeom prst="rect">
             <a:avLst/>
@@ -19844,7 +19959,7 @@
         <p:spPr>
           <a:xfrm>
             <a:off x="502920" y="300600"/>
-            <a:ext cx="9065520" cy="6921000"/>
+            <a:ext cx="9065160" cy="6920640"/>
           </a:xfrm>
           <a:prstGeom prst="rect">
             <a:avLst/>
@@ -19961,7 +20076,7 @@
         <p:spPr>
           <a:xfrm>
             <a:off x="-18720" y="1028880"/>
-            <a:ext cx="10095840" cy="5504760"/>
+            <a:ext cx="10095480" cy="5504400"/>
           </a:xfrm>
           <a:prstGeom prst="rect">
             <a:avLst/>
@@ -20044,7 +20159,7 @@
         <p:spPr>
           <a:xfrm>
             <a:off x="0" y="0"/>
-            <a:ext cx="10076040" cy="1561320"/>
+            <a:ext cx="10075680" cy="1560960"/>
           </a:xfrm>
           <a:prstGeom prst="rect">
             <a:avLst/>
@@ -20095,7 +20210,7 @@
         <p:spPr>
           <a:xfrm>
             <a:off x="502920" y="1768680"/>
-            <a:ext cx="9065520" cy="4383000"/>
+            <a:ext cx="9065160" cy="4382640"/>
           </a:xfrm>
           <a:prstGeom prst="rect">
             <a:avLst/>
@@ -20121,7 +20236,7 @@
         <p:spPr>
           <a:xfrm>
             <a:off x="554040" y="1738800"/>
-            <a:ext cx="8960760" cy="5500080"/>
+            <a:ext cx="8960400" cy="5499720"/>
           </a:xfrm>
           <a:prstGeom prst="rect">
             <a:avLst/>
@@ -20151,6 +20266,7 @@
                   <a:srgbClr val="f6343f"/>
                 </a:solidFill>
                 <a:latin typeface="Noto Sans"/>
+                <a:ea typeface="DejaVu Sans"/>
               </a:rPr>
               <a:t>- dependency-a.jar</a:t>
             </a:r>
@@ -20170,6 +20286,7 @@
                   <a:srgbClr val="f6343f"/>
                 </a:solidFill>
                 <a:latin typeface="Noto Sans"/>
+                <a:ea typeface="DejaVu Sans"/>
               </a:rPr>
               <a:t>    </a:t>
             </a:r>
@@ -20179,6 +20296,7 @@
                   <a:srgbClr val="f6343f"/>
                 </a:solidFill>
                 <a:latin typeface="Noto Sans"/>
+                <a:ea typeface="DejaVu Sans"/>
               </a:rPr>
               <a:t>- </a:t>
             </a:r>
@@ -20188,6 +20306,7 @@
                   <a:srgbClr val="666666"/>
                 </a:solidFill>
                 <a:latin typeface="Noto Mono"/>
+                <a:ea typeface="DejaVu Sans"/>
               </a:rPr>
               <a:t>@Explosive class C4 {}</a:t>
             </a:r>
@@ -20550,7 +20669,7 @@
         <p:spPr>
           <a:xfrm>
             <a:off x="0" y="0"/>
-            <a:ext cx="10076040" cy="1561320"/>
+            <a:ext cx="10075680" cy="1560960"/>
           </a:xfrm>
           <a:prstGeom prst="rect">
             <a:avLst/>
@@ -20601,7 +20720,7 @@
         <p:spPr>
           <a:xfrm>
             <a:off x="502920" y="1768680"/>
-            <a:ext cx="9065520" cy="4383000"/>
+            <a:ext cx="9065160" cy="4382640"/>
           </a:xfrm>
           <a:prstGeom prst="rect">
             <a:avLst/>
@@ -20632,7 +20751,7 @@
         <p:spPr>
           <a:xfrm>
             <a:off x="0" y="1540440"/>
-            <a:ext cx="10077120" cy="6022440"/>
+            <a:ext cx="10076760" cy="6022080"/>
           </a:xfrm>
           <a:prstGeom prst="rect">
             <a:avLst/>
@@ -20644,14 +20763,14 @@
       </p:pic>
       <p:sp>
         <p:nvSpPr>
-          <p:cNvPr id="305" name="TextShape 3"/>
-          <p:cNvSpPr txBox="1"/>
+          <p:cNvPr id="305" name="CustomShape 3"/>
+          <p:cNvSpPr/>
           <p:nvPr/>
         </p:nvSpPr>
         <p:spPr>
           <a:xfrm>
             <a:off x="548640" y="6035040"/>
-            <a:ext cx="5760720" cy="1197000"/>
+            <a:ext cx="5760360" cy="1196640"/>
           </a:xfrm>
           <a:prstGeom prst="rect">
             <a:avLst/>
@@ -20663,9 +20782,20 @@
             <a:noFill/>
           </a:ln>
         </p:spPr>
+        <p:style>
+          <a:lnRef idx="0"/>
+          <a:fillRef idx="0"/>
+          <a:effectRef idx="0"/>
+          <a:fontRef idx="minor"/>
+        </p:style>
         <p:txBody>
           <a:bodyPr lIns="90000" rIns="90000" tIns="45000" bIns="45000"/>
           <a:p>
+            <a:pPr>
+              <a:lnSpc>
+                <a:spcPct val="100000"/>
+              </a:lnSpc>
+            </a:pPr>
             <a:r>
               <a:rPr b="1" lang="en-US" sz="3200" spc="-1" strike="noStrike">
                 <a:solidFill>
@@ -20675,11 +20805,8 @@
               </a:rPr>
               <a:t>Dear, this jar is not fat enough for the two of us</a:t>
             </a:r>
-            <a:endParaRPr b="1" lang="en-US" sz="3200" spc="-1" strike="noStrike">
-              <a:solidFill>
-                <a:srgbClr val="ffffff"/>
-              </a:solidFill>
-              <a:latin typeface="Noto Sans"/>
+            <a:endParaRPr b="0" lang="en-US" sz="3200" spc="-1" strike="noStrike">
+              <a:latin typeface="Arial"/>
             </a:endParaRPr>
           </a:p>
         </p:txBody>
@@ -20757,7 +20884,7 @@
         <p:spPr>
           <a:xfrm>
             <a:off x="0" y="0"/>
-            <a:ext cx="10076040" cy="1561320"/>
+            <a:ext cx="10075680" cy="1560960"/>
           </a:xfrm>
           <a:prstGeom prst="rect">
             <a:avLst/>
@@ -20808,7 +20935,7 @@
         <p:spPr>
           <a:xfrm>
             <a:off x="502920" y="1768680"/>
-            <a:ext cx="9065520" cy="4383000"/>
+            <a:ext cx="9065160" cy="4382640"/>
           </a:xfrm>
           <a:prstGeom prst="rect">
             <a:avLst/>
@@ -20834,7 +20961,7 @@
         <p:spPr>
           <a:xfrm>
             <a:off x="503280" y="1769040"/>
-            <a:ext cx="9067680" cy="4384800"/>
+            <a:ext cx="9067320" cy="4384440"/>
           </a:xfrm>
           <a:prstGeom prst="rect">
             <a:avLst/>
@@ -20860,7 +20987,7 @@
         <p:spPr>
           <a:xfrm>
             <a:off x="411480" y="3133080"/>
-            <a:ext cx="9372240" cy="1337040"/>
+            <a:ext cx="9371880" cy="1336680"/>
           </a:xfrm>
           <a:prstGeom prst="rect">
             <a:avLst/>
@@ -20890,6 +21017,7 @@
                   <a:srgbClr val="f6343f"/>
                 </a:solidFill>
                 <a:latin typeface="Noto Sans"/>
+                <a:ea typeface="DejaVu Sans"/>
               </a:rPr>
               <a:t>Псевдорешение: проверять текущие артефакты и делать автоинкремент</a:t>
             </a:r>
@@ -20908,7 +21036,7 @@
         <p:spPr>
           <a:xfrm>
             <a:off x="502920" y="4937760"/>
-            <a:ext cx="9065160" cy="1056240"/>
+            <a:ext cx="9064800" cy="1055880"/>
           </a:xfrm>
           <a:prstGeom prst="rect">
             <a:avLst/>
@@ -20938,6 +21066,7 @@
                   <a:srgbClr val="f6343f"/>
                 </a:solidFill>
                 <a:latin typeface="Noto Sans"/>
+                <a:ea typeface="DejaVu Sans"/>
               </a:rPr>
               <a:t>- ExplosiveStash1</a:t>
             </a:r>
@@ -20957,6 +21086,7 @@
                   <a:srgbClr val="f6343f"/>
                 </a:solidFill>
                 <a:latin typeface="Noto Sans"/>
+                <a:ea typeface="DejaVu Sans"/>
               </a:rPr>
               <a:t>- ExplosiveStash2</a:t>
             </a:r>
@@ -21039,7 +21169,7 @@
         <p:spPr>
           <a:xfrm>
             <a:off x="0" y="0"/>
-            <a:ext cx="10076040" cy="1561320"/>
+            <a:ext cx="10075680" cy="1560960"/>
           </a:xfrm>
           <a:prstGeom prst="rect">
             <a:avLst/>
@@ -21090,7 +21220,7 @@
         <p:spPr>
           <a:xfrm>
             <a:off x="502920" y="1768680"/>
-            <a:ext cx="9065520" cy="4383000"/>
+            <a:ext cx="9065160" cy="4382640"/>
           </a:xfrm>
           <a:prstGeom prst="rect">
             <a:avLst/>
@@ -21116,7 +21246,7 @@
         <p:spPr>
           <a:xfrm>
             <a:off x="503280" y="1769040"/>
-            <a:ext cx="9067680" cy="4384800"/>
+            <a:ext cx="9067320" cy="4384440"/>
           </a:xfrm>
           <a:prstGeom prst="rect">
             <a:avLst/>
@@ -21142,7 +21272,7 @@
         <p:spPr>
           <a:xfrm>
             <a:off x="505800" y="2834640"/>
-            <a:ext cx="9065160" cy="2988720"/>
+            <a:ext cx="9064800" cy="2988360"/>
           </a:xfrm>
           <a:prstGeom prst="rect">
             <a:avLst/>
@@ -21172,6 +21302,7 @@
                   <a:srgbClr val="f6343f"/>
                 </a:solidFill>
                 <a:latin typeface="Noto Sans"/>
+                <a:ea typeface="DejaVu Sans"/>
               </a:rPr>
               <a:t>- dependency-a.jar:</a:t>
             </a:r>
@@ -21191,6 +21322,7 @@
                   <a:srgbClr val="f6343f"/>
                 </a:solidFill>
                 <a:latin typeface="Noto Sans"/>
+                <a:ea typeface="DejaVu Sans"/>
               </a:rPr>
               <a:t>     </a:t>
             </a:r>
@@ -21200,6 +21332,7 @@
                   <a:srgbClr val="f6343f"/>
                 </a:solidFill>
                 <a:latin typeface="Noto Sans"/>
+                <a:ea typeface="DejaVu Sans"/>
               </a:rPr>
               <a:t>- ExplosiveStash1.class</a:t>
             </a:r>
@@ -21219,6 +21352,7 @@
                   <a:srgbClr val="f6343f"/>
                 </a:solidFill>
                 <a:latin typeface="Noto Sans"/>
+                <a:ea typeface="DejaVu Sans"/>
               </a:rPr>
               <a:t>- dependency-b.jar:</a:t>
             </a:r>
@@ -21238,6 +21372,7 @@
                   <a:srgbClr val="f6343f"/>
                 </a:solidFill>
                 <a:latin typeface="Noto Sans"/>
+                <a:ea typeface="DejaVu Sans"/>
               </a:rPr>
               <a:t>     </a:t>
             </a:r>
@@ -21247,6 +21382,7 @@
                   <a:srgbClr val="f6343f"/>
                 </a:solidFill>
                 <a:latin typeface="Noto Sans"/>
+                <a:ea typeface="DejaVu Sans"/>
               </a:rPr>
               <a:t>- ExplosiveStash1.class</a:t>
             </a:r>
@@ -21266,6 +21402,7 @@
                   <a:srgbClr val="f6343f"/>
                 </a:solidFill>
                 <a:latin typeface="Noto Sans"/>
+                <a:ea typeface="DejaVu Sans"/>
               </a:rPr>
               <a:t>- fat.jar</a:t>
             </a:r>
@@ -21285,6 +21422,7 @@
                   <a:srgbClr val="f6343f"/>
                 </a:solidFill>
                 <a:latin typeface="Noto Sans"/>
+                <a:ea typeface="DejaVu Sans"/>
               </a:rPr>
               <a:t>     </a:t>
             </a:r>
@@ -21294,6 +21432,7 @@
                   <a:srgbClr val="f6343f"/>
                 </a:solidFill>
                 <a:latin typeface="Noto Sans"/>
+                <a:ea typeface="DejaVu Sans"/>
               </a:rPr>
               <a:t>- ExplosiveStash1.class (dep-a? dep-b?)</a:t>
             </a:r>
@@ -21376,7 +21515,7 @@
         <p:spPr>
           <a:xfrm>
             <a:off x="0" y="0"/>
-            <a:ext cx="10076040" cy="1561320"/>
+            <a:ext cx="10075680" cy="1560960"/>
           </a:xfrm>
           <a:prstGeom prst="rect">
             <a:avLst/>
@@ -21427,7 +21566,7 @@
         <p:spPr>
           <a:xfrm>
             <a:off x="502920" y="1768680"/>
-            <a:ext cx="9065520" cy="4383000"/>
+            <a:ext cx="9065160" cy="4382640"/>
           </a:xfrm>
           <a:prstGeom prst="rect">
             <a:avLst/>
@@ -21453,7 +21592,7 @@
         <p:spPr>
           <a:xfrm>
             <a:off x="503280" y="1769040"/>
-            <a:ext cx="9067680" cy="4384800"/>
+            <a:ext cx="9067320" cy="4384440"/>
           </a:xfrm>
           <a:prstGeom prst="rect">
             <a:avLst/>
@@ -21478,13 +21617,13 @@
         </p:nvPicPr>
         <p:blipFill>
           <a:blip r:embed="rId1"/>
-          <a:srcRect l="25104" t="12640" r="4740" b="12990"/>
+          <a:srcRect l="25108" t="12640" r="4740" b="12990"/>
           <a:stretch/>
         </p:blipFill>
         <p:spPr>
           <a:xfrm>
             <a:off x="0" y="1554480"/>
-            <a:ext cx="10077120" cy="6008400"/>
+            <a:ext cx="10076760" cy="6008040"/>
           </a:xfrm>
           <a:prstGeom prst="rect">
             <a:avLst/>
@@ -21496,14 +21635,14 @@
       </p:pic>
       <p:sp>
         <p:nvSpPr>
-          <p:cNvPr id="319" name="TextShape 4"/>
-          <p:cNvSpPr txBox="1"/>
+          <p:cNvPr id="319" name="CustomShape 4"/>
+          <p:cNvSpPr/>
           <p:nvPr/>
         </p:nvSpPr>
         <p:spPr>
           <a:xfrm rot="3600000">
-            <a:off x="5737320" y="3483000"/>
-            <a:ext cx="4419360" cy="1247760"/>
+            <a:off x="5737320" y="3482640"/>
+            <a:ext cx="4419000" cy="1247400"/>
           </a:xfrm>
           <a:prstGeom prst="rect">
             <a:avLst/>
@@ -21515,9 +21654,20 @@
             <a:noFill/>
           </a:ln>
         </p:spPr>
+        <p:style>
+          <a:lnRef idx="0"/>
+          <a:fillRef idx="0"/>
+          <a:effectRef idx="0"/>
+          <a:fontRef idx="minor"/>
+        </p:style>
         <p:txBody>
           <a:bodyPr lIns="90000" rIns="90000" tIns="45000" bIns="45000"/>
           <a:p>
+            <a:pPr marL="255960">
+              <a:lnSpc>
+                <a:spcPct val="100000"/>
+              </a:lnSpc>
+            </a:pPr>
             <a:r>
               <a:rPr b="1" lang="en-US" sz="3200" spc="-1" strike="noStrike">
                 <a:solidFill>
@@ -21527,11 +21677,8 @@
               </a:rPr>
               <a:t>А оно уже третий день как в проде</a:t>
             </a:r>
-            <a:endParaRPr b="1" lang="en-US" sz="3200" spc="-1" strike="noStrike">
-              <a:solidFill>
-                <a:srgbClr val="ffffff"/>
-              </a:solidFill>
-              <a:latin typeface="Noto Sans"/>
+            <a:endParaRPr b="0" lang="en-US" sz="3200" spc="-1" strike="noStrike">
+              <a:latin typeface="Arial"/>
             </a:endParaRPr>
           </a:p>
         </p:txBody>
@@ -21609,7 +21756,7 @@
         <p:spPr>
           <a:xfrm>
             <a:off x="0" y="0"/>
-            <a:ext cx="10076040" cy="1561320"/>
+            <a:ext cx="10075680" cy="1560960"/>
           </a:xfrm>
           <a:prstGeom prst="rect">
             <a:avLst/>
@@ -21660,7 +21807,7 @@
         <p:spPr>
           <a:xfrm>
             <a:off x="502920" y="1768680"/>
-            <a:ext cx="9065520" cy="4383000"/>
+            <a:ext cx="9065160" cy="4382640"/>
           </a:xfrm>
           <a:prstGeom prst="rect">
             <a:avLst/>
@@ -21686,7 +21833,7 @@
         <p:spPr>
           <a:xfrm>
             <a:off x="503280" y="1769040"/>
-            <a:ext cx="9067680" cy="4384800"/>
+            <a:ext cx="9067320" cy="4384440"/>
           </a:xfrm>
           <a:prstGeom prst="rect">
             <a:avLst/>
@@ -21712,7 +21859,7 @@
         <p:spPr>
           <a:xfrm>
             <a:off x="411480" y="2503080"/>
-            <a:ext cx="9372240" cy="1196640"/>
+            <a:ext cx="9371880" cy="1196280"/>
           </a:xfrm>
           <a:prstGeom prst="rect">
             <a:avLst/>
@@ -21742,6 +21889,7 @@
                   <a:srgbClr val="f6343f"/>
                 </a:solidFill>
                 <a:latin typeface="Noto Sans"/>
+                <a:ea typeface="DejaVu Sans"/>
               </a:rPr>
               <a:t>Решение: не создавать блин артефакты с повторяющимися именами</a:t>
             </a:r>
@@ -21760,7 +21908,7 @@
         <p:spPr>
           <a:xfrm>
             <a:off x="502920" y="4206240"/>
-            <a:ext cx="9065160" cy="2022480"/>
+            <a:ext cx="9064800" cy="2022120"/>
           </a:xfrm>
           <a:prstGeom prst="rect">
             <a:avLst/>
@@ -21790,6 +21938,7 @@
                   <a:srgbClr val="f6343f"/>
                 </a:solidFill>
                 <a:latin typeface="Noto Sans"/>
+                <a:ea typeface="DejaVu Sans"/>
               </a:rPr>
               <a:t>Лучше использовать рандом (например, UUID) для создания уникального имени</a:t>
             </a:r>
@@ -21819,6 +21968,7 @@
                   <a:srgbClr val="f6343f"/>
                 </a:solidFill>
                 <a:latin typeface="Noto Sans"/>
+                <a:ea typeface="DejaVu Sans"/>
               </a:rPr>
               <a:t>Перфекционист страдает, функциональность - нет</a:t>
             </a:r>
@@ -21901,7 +22051,7 @@
         <p:spPr>
           <a:xfrm>
             <a:off x="502920" y="300600"/>
-            <a:ext cx="9065520" cy="6921000"/>
+            <a:ext cx="9065160" cy="6920640"/>
           </a:xfrm>
           <a:prstGeom prst="rect">
             <a:avLst/>
@@ -22014,7 +22164,7 @@
         <p:spPr>
           <a:xfrm>
             <a:off x="0" y="0"/>
-            <a:ext cx="10076040" cy="1561320"/>
+            <a:ext cx="10075680" cy="1560960"/>
           </a:xfrm>
           <a:prstGeom prst="rect">
             <a:avLst/>
@@ -22065,7 +22215,7 @@
         <p:spPr>
           <a:xfrm>
             <a:off x="502920" y="1768680"/>
-            <a:ext cx="9065520" cy="4383000"/>
+            <a:ext cx="9065160" cy="4382640"/>
           </a:xfrm>
           <a:prstGeom prst="rect">
             <a:avLst/>
@@ -22091,7 +22241,7 @@
         <p:spPr>
           <a:xfrm>
             <a:off x="554040" y="2298240"/>
-            <a:ext cx="8960760" cy="3830760"/>
+            <a:ext cx="8960400" cy="3830400"/>
           </a:xfrm>
           <a:prstGeom prst="rect">
             <a:avLst/>
@@ -22121,6 +22271,7 @@
                   <a:srgbClr val="f6343f"/>
                 </a:solidFill>
                 <a:latin typeface="Noto Sans"/>
+                <a:ea typeface="DejaVu Sans"/>
               </a:rPr>
               <a:t>- anything.jar</a:t>
             </a:r>
@@ -22333,7 +22484,7 @@
         <p:spPr>
           <a:xfrm>
             <a:off x="0" y="0"/>
-            <a:ext cx="10076040" cy="1561320"/>
+            <a:ext cx="10075680" cy="1560960"/>
           </a:xfrm>
           <a:prstGeom prst="rect">
             <a:avLst/>
@@ -22384,7 +22535,7 @@
         <p:spPr>
           <a:xfrm>
             <a:off x="502920" y="1768680"/>
-            <a:ext cx="9065520" cy="4383000"/>
+            <a:ext cx="9065160" cy="4382640"/>
           </a:xfrm>
           <a:prstGeom prst="rect">
             <a:avLst/>
@@ -22410,7 +22561,7 @@
         <p:spPr>
           <a:xfrm>
             <a:off x="554040" y="2298240"/>
-            <a:ext cx="8960760" cy="3830760"/>
+            <a:ext cx="8960400" cy="3830400"/>
           </a:xfrm>
           <a:prstGeom prst="rect">
             <a:avLst/>
@@ -22435,13 +22586,13 @@
         </p:nvPicPr>
         <p:blipFill>
           <a:blip r:embed="rId1"/>
-          <a:srcRect l="4770" t="0" r="25726" b="0"/>
+          <a:srcRect l="4771" t="0" r="25729" b="0"/>
           <a:stretch/>
         </p:blipFill>
         <p:spPr>
           <a:xfrm>
             <a:off x="0" y="1564200"/>
-            <a:ext cx="10077120" cy="5998680"/>
+            <a:ext cx="10076760" cy="5998320"/>
           </a:xfrm>
           <a:prstGeom prst="rect">
             <a:avLst/>
@@ -22459,8 +22610,8 @@
         </p:nvSpPr>
         <p:spPr>
           <a:xfrm rot="2880000">
-            <a:off x="-299880" y="4991760"/>
-            <a:ext cx="5029560" cy="769320"/>
+            <a:off x="-299520" y="4991400"/>
+            <a:ext cx="5029200" cy="768960"/>
           </a:xfrm>
           <a:prstGeom prst="rect">
             <a:avLst/>
@@ -22492,6 +22643,7 @@
                   <a:srgbClr val="ffffff"/>
                 </a:solidFill>
                 <a:latin typeface="Noto Sans"/>
+                <a:ea typeface="DejaVu Sans"/>
               </a:rPr>
               <a:t>CPU usage: 100%</a:t>
             </a:r>
@@ -22574,7 +22726,7 @@
         <p:spPr>
           <a:xfrm>
             <a:off x="0" y="0"/>
-            <a:ext cx="10076040" cy="1561320"/>
+            <a:ext cx="10075680" cy="1560960"/>
           </a:xfrm>
           <a:prstGeom prst="rect">
             <a:avLst/>
@@ -22625,7 +22777,7 @@
         <p:spPr>
           <a:xfrm>
             <a:off x="502920" y="1768680"/>
-            <a:ext cx="9065520" cy="4383000"/>
+            <a:ext cx="9065160" cy="4382640"/>
           </a:xfrm>
           <a:prstGeom prst="rect">
             <a:avLst/>
@@ -22651,7 +22803,7 @@
         <p:spPr>
           <a:xfrm>
             <a:off x="548640" y="3791160"/>
-            <a:ext cx="8960760" cy="781920"/>
+            <a:ext cx="8960400" cy="781560"/>
           </a:xfrm>
           <a:prstGeom prst="rect">
             <a:avLst/>
@@ -22681,6 +22833,7 @@
                   <a:srgbClr val="f6343f"/>
                 </a:solidFill>
                 <a:latin typeface="Noto Sans"/>
+                <a:ea typeface="DejaVu Sans"/>
               </a:rPr>
               <a:t>Просто будьте аккуратны</a:t>
             </a:r>
@@ -22762,7 +22915,7 @@
         </p:nvGraphicFramePr>
         <p:xfrm>
           <a:off x="359640" y="147960"/>
-          <a:ext cx="9355320" cy="6857640"/>
+          <a:ext cx="9354960" cy="6857280"/>
         </p:xfrm>
         <a:graphic>
           <a:graphicData uri="http://schemas.openxmlformats.org/drawingml/2006/chart">
@@ -22779,7 +22932,7 @@
         <p:spPr>
           <a:xfrm>
             <a:off x="1280160" y="4222800"/>
-            <a:ext cx="1554120" cy="401040"/>
+            <a:ext cx="1553760" cy="400680"/>
           </a:xfrm>
           <a:prstGeom prst="rect">
             <a:avLst/>
@@ -22809,6 +22962,7 @@
                   <a:srgbClr val="f6343f"/>
                 </a:solidFill>
                 <a:latin typeface="Noto Sans"/>
+                <a:ea typeface="DejaVu Sans"/>
               </a:rPr>
               <a:t>Compiler</a:t>
             </a:r>
@@ -22827,7 +22981,7 @@
         <p:spPr>
           <a:xfrm>
             <a:off x="4261680" y="2341800"/>
-            <a:ext cx="1554120" cy="401040"/>
+            <a:ext cx="1553760" cy="400680"/>
           </a:xfrm>
           <a:prstGeom prst="rect">
             <a:avLst/>
@@ -22857,6 +23011,7 @@
                   <a:srgbClr val="f6343f"/>
                 </a:solidFill>
                 <a:latin typeface="Noto Sans"/>
+                <a:ea typeface="DejaVu Sans"/>
               </a:rPr>
               <a:t>Bytecode</a:t>
             </a:r>
@@ -22875,7 +23030,7 @@
         <p:spPr>
           <a:xfrm>
             <a:off x="7259760" y="457200"/>
-            <a:ext cx="1554120" cy="401040"/>
+            <a:ext cx="1553760" cy="400680"/>
           </a:xfrm>
           <a:prstGeom prst="rect">
             <a:avLst/>
@@ -22905,6 +23060,7 @@
                   <a:srgbClr val="f6343f"/>
                 </a:solidFill>
                 <a:latin typeface="Noto Sans"/>
+                <a:ea typeface="DejaVu Sans"/>
               </a:rPr>
               <a:t>Runtime</a:t>
             </a:r>
@@ -22987,7 +23143,7 @@
         <p:spPr>
           <a:xfrm>
             <a:off x="502920" y="300600"/>
-            <a:ext cx="9065520" cy="6921000"/>
+            <a:ext cx="9065160" cy="6920640"/>
           </a:xfrm>
           <a:prstGeom prst="rect">
             <a:avLst/>
@@ -23140,7 +23296,7 @@
         <p:spPr>
           <a:xfrm>
             <a:off x="0" y="0"/>
-            <a:ext cx="10076040" cy="1561320"/>
+            <a:ext cx="10075680" cy="1560960"/>
           </a:xfrm>
           <a:prstGeom prst="rect">
             <a:avLst/>
@@ -23191,7 +23347,7 @@
         <p:spPr>
           <a:xfrm>
             <a:off x="502920" y="1768680"/>
-            <a:ext cx="9065520" cy="4383000"/>
+            <a:ext cx="9065160" cy="4382640"/>
           </a:xfrm>
           <a:prstGeom prst="rect">
             <a:avLst/>
@@ -23217,7 +23373,7 @@
         <p:spPr>
           <a:xfrm>
             <a:off x="503280" y="1769040"/>
-            <a:ext cx="9067680" cy="4384800"/>
+            <a:ext cx="9067320" cy="4384440"/>
           </a:xfrm>
           <a:prstGeom prst="rect">
             <a:avLst/>
@@ -23421,7 +23577,7 @@
         <p:spPr>
           <a:xfrm>
             <a:off x="-360" y="1562040"/>
-            <a:ext cx="10076760" cy="6000840"/>
+            <a:ext cx="10076400" cy="6000480"/>
           </a:xfrm>
           <a:prstGeom prst="rect">
             <a:avLst/>
@@ -23440,7 +23596,7 @@
         <p:spPr>
           <a:xfrm>
             <a:off x="503280" y="1769040"/>
-            <a:ext cx="9067680" cy="4384800"/>
+            <a:ext cx="9067320" cy="4384440"/>
           </a:xfrm>
           <a:prstGeom prst="rect">
             <a:avLst/>
@@ -23466,7 +23622,7 @@
         <p:spPr>
           <a:xfrm>
             <a:off x="0" y="0"/>
-            <a:ext cx="10076040" cy="1561320"/>
+            <a:ext cx="10075680" cy="1560960"/>
           </a:xfrm>
           <a:prstGeom prst="rect">
             <a:avLst/>
@@ -23520,8 +23676,8 @@
         </p:blipFill>
         <p:spPr>
           <a:xfrm rot="18540000">
-            <a:off x="7494840" y="2648520"/>
-            <a:ext cx="1370520" cy="1370520"/>
+            <a:off x="7494480" y="2648520"/>
+            <a:ext cx="1370160" cy="1370160"/>
           </a:xfrm>
           <a:prstGeom prst="rect">
             <a:avLst/>
@@ -23540,7 +23696,7 @@
         <p:spPr>
           <a:xfrm>
             <a:off x="6675120" y="1891080"/>
-            <a:ext cx="2925720" cy="852120"/>
+            <a:ext cx="2925360" cy="851760"/>
           </a:xfrm>
           <a:prstGeom prst="rect">
             <a:avLst/>
@@ -23572,6 +23728,7 @@
                   <a:srgbClr val="ffffff"/>
                 </a:solidFill>
                 <a:latin typeface="Noto Sans"/>
+                <a:ea typeface="DejaVu Sans"/>
               </a:rPr>
               <a:t>JAR hell</a:t>
             </a:r>
@@ -23654,7 +23811,7 @@
         <p:spPr>
           <a:xfrm>
             <a:off x="0" y="0"/>
-            <a:ext cx="10076040" cy="1561320"/>
+            <a:ext cx="10075680" cy="1560960"/>
           </a:xfrm>
           <a:prstGeom prst="rect">
             <a:avLst/>
@@ -23705,7 +23862,7 @@
         <p:spPr>
           <a:xfrm>
             <a:off x="502920" y="1768680"/>
-            <a:ext cx="9065520" cy="4383000"/>
+            <a:ext cx="9065160" cy="4382640"/>
           </a:xfrm>
           <a:prstGeom prst="rect">
             <a:avLst/>
@@ -23731,7 +23888,7 @@
         <p:spPr>
           <a:xfrm>
             <a:off x="503280" y="1769040"/>
-            <a:ext cx="9067680" cy="4384800"/>
+            <a:ext cx="9067320" cy="4384440"/>
           </a:xfrm>
           <a:prstGeom prst="rect">
             <a:avLst/>
@@ -23757,7 +23914,7 @@
         <p:spPr>
           <a:xfrm>
             <a:off x="411480" y="3133080"/>
-            <a:ext cx="9372240" cy="836640"/>
+            <a:ext cx="9371880" cy="836280"/>
           </a:xfrm>
           <a:prstGeom prst="rect">
             <a:avLst/>
@@ -23787,6 +23944,7 @@
                   <a:srgbClr val="f6343f"/>
                 </a:solidFill>
                 <a:latin typeface="Noto Sans"/>
+                <a:ea typeface="DejaVu Sans"/>
               </a:rPr>
               <a:t>Решение: шейдить джарник</a:t>
             </a:r>
@@ -23805,7 +23963,7 @@
         <p:spPr>
           <a:xfrm>
             <a:off x="503280" y="4543920"/>
-            <a:ext cx="9065160" cy="882720"/>
+            <a:ext cx="9064800" cy="882360"/>
           </a:xfrm>
           <a:prstGeom prst="rect">
             <a:avLst/>
@@ -23835,6 +23993,7 @@
                   <a:srgbClr val="f6343f"/>
                 </a:solidFill>
                 <a:latin typeface="Arial"/>
+                <a:ea typeface="DejaVu Sans"/>
               </a:rPr>
               <a:t>com.google.* → your.artifact.id.com.google.*</a:t>
             </a:r>
@@ -23917,7 +24076,7 @@
         <p:spPr>
           <a:xfrm>
             <a:off x="0" y="0"/>
-            <a:ext cx="10076040" cy="1561320"/>
+            <a:ext cx="10075680" cy="1560960"/>
           </a:xfrm>
           <a:prstGeom prst="rect">
             <a:avLst/>
@@ -23968,7 +24127,7 @@
         <p:spPr>
           <a:xfrm>
             <a:off x="502920" y="1768680"/>
-            <a:ext cx="9065520" cy="4383000"/>
+            <a:ext cx="9065160" cy="4382640"/>
           </a:xfrm>
           <a:prstGeom prst="rect">
             <a:avLst/>
@@ -23994,7 +24153,7 @@
         <p:spPr>
           <a:xfrm>
             <a:off x="503280" y="1769040"/>
-            <a:ext cx="9067680" cy="4384800"/>
+            <a:ext cx="9067320" cy="4384440"/>
           </a:xfrm>
           <a:prstGeom prst="rect">
             <a:avLst/>
@@ -24020,7 +24179,7 @@
         <p:spPr>
           <a:xfrm>
             <a:off x="503280" y="3425760"/>
-            <a:ext cx="9065160" cy="1279080"/>
+            <a:ext cx="9064800" cy="1278720"/>
           </a:xfrm>
           <a:prstGeom prst="rect">
             <a:avLst/>
@@ -24050,6 +24209,7 @@
                   <a:srgbClr val="f6343f"/>
                 </a:solidFill>
                 <a:latin typeface="Arial"/>
+                <a:ea typeface="DejaVu Sans"/>
               </a:rPr>
               <a:t>Так как процессор нужен только для компиляции (mvn scope: provided), это не будет засорять конечный артефакт</a:t>
             </a:r>
@@ -24132,7 +24292,7 @@
         <p:spPr>
           <a:xfrm>
             <a:off x="502920" y="300600"/>
-            <a:ext cx="9065520" cy="6921000"/>
+            <a:ext cx="9065160" cy="6920640"/>
           </a:xfrm>
           <a:prstGeom prst="rect">
             <a:avLst/>
@@ -24245,7 +24405,7 @@
         <p:spPr>
           <a:xfrm>
             <a:off x="502920" y="300600"/>
-            <a:ext cx="9065520" cy="6921000"/>
+            <a:ext cx="9065160" cy="6920640"/>
           </a:xfrm>
           <a:prstGeom prst="rect">
             <a:avLst/>
@@ -24358,7 +24518,7 @@
         <p:spPr>
           <a:xfrm>
             <a:off x="502920" y="300600"/>
-            <a:ext cx="9065520" cy="6921000"/>
+            <a:ext cx="9065160" cy="6920640"/>
           </a:xfrm>
           <a:prstGeom prst="rect">
             <a:avLst/>
@@ -24471,7 +24631,7 @@
         <p:spPr>
           <a:xfrm>
             <a:off x="502920" y="300600"/>
-            <a:ext cx="9065520" cy="6921000"/>
+            <a:ext cx="9065160" cy="6920640"/>
           </a:xfrm>
           <a:prstGeom prst="rect">
             <a:avLst/>
@@ -24584,7 +24744,7 @@
         <p:spPr>
           <a:xfrm>
             <a:off x="502920" y="300600"/>
-            <a:ext cx="9065520" cy="6921000"/>
+            <a:ext cx="9065160" cy="6920640"/>
           </a:xfrm>
           <a:prstGeom prst="rect">
             <a:avLst/>
@@ -24697,7 +24857,7 @@
         <p:spPr>
           <a:xfrm>
             <a:off x="360" y="360"/>
-            <a:ext cx="10074600" cy="1562040"/>
+            <a:ext cx="10074240" cy="1561680"/>
           </a:xfrm>
           <a:prstGeom prst="rect">
             <a:avLst/>
@@ -24748,7 +24908,7 @@
         <p:spPr>
           <a:xfrm>
             <a:off x="502920" y="1768680"/>
-            <a:ext cx="9065520" cy="4383000"/>
+            <a:ext cx="9065160" cy="4382640"/>
           </a:xfrm>
           <a:prstGeom prst="rect">
             <a:avLst/>
@@ -24904,7 +25064,7 @@
         <p:spPr>
           <a:xfrm>
             <a:off x="502920" y="1768680"/>
-            <a:ext cx="9065520" cy="4383000"/>
+            <a:ext cx="9065160" cy="4382640"/>
           </a:xfrm>
           <a:prstGeom prst="rect">
             <a:avLst/>
@@ -24973,7 +25133,7 @@
         <p:spPr>
           <a:xfrm>
             <a:off x="0" y="0"/>
-            <a:ext cx="10077120" cy="1561320"/>
+            <a:ext cx="10076760" cy="1560960"/>
           </a:xfrm>
           <a:prstGeom prst="rect">
             <a:avLst/>
@@ -25088,7 +25248,7 @@
         <p:spPr>
           <a:xfrm>
             <a:off x="502920" y="300600"/>
-            <a:ext cx="9065520" cy="6921000"/>
+            <a:ext cx="9065160" cy="6920640"/>
           </a:xfrm>
           <a:prstGeom prst="rect">
             <a:avLst/>
@@ -25194,7 +25354,7 @@
         <p:spPr>
           <a:xfrm>
             <a:off x="502920" y="1768680"/>
-            <a:ext cx="9065520" cy="4383000"/>
+            <a:ext cx="9065160" cy="4382640"/>
           </a:xfrm>
           <a:prstGeom prst="rect">
             <a:avLst/>
@@ -25263,7 +25423,7 @@
         <p:spPr>
           <a:xfrm>
             <a:off x="0" y="0"/>
-            <a:ext cx="10077120" cy="1561320"/>
+            <a:ext cx="10076760" cy="1560960"/>
           </a:xfrm>
           <a:prstGeom prst="rect">
             <a:avLst/>
@@ -25371,7 +25531,7 @@
         <p:spPr>
           <a:xfrm>
             <a:off x="502920" y="1768680"/>
-            <a:ext cx="9065520" cy="4383000"/>
+            <a:ext cx="9065160" cy="4382640"/>
           </a:xfrm>
           <a:prstGeom prst="rect">
             <a:avLst/>
@@ -25420,7 +25580,7 @@
         <p:spPr>
           <a:xfrm>
             <a:off x="0" y="0"/>
-            <a:ext cx="10077120" cy="1561320"/>
+            <a:ext cx="10076760" cy="1560960"/>
           </a:xfrm>
           <a:prstGeom prst="rect">
             <a:avLst/>
@@ -25535,7 +25695,7 @@
         <p:spPr>
           <a:xfrm>
             <a:off x="502920" y="300600"/>
-            <a:ext cx="9065520" cy="6921000"/>
+            <a:ext cx="9065160" cy="6920640"/>
           </a:xfrm>
           <a:prstGeom prst="rect">
             <a:avLst/>
@@ -25641,7 +25801,7 @@
         <p:spPr>
           <a:xfrm>
             <a:off x="502920" y="1768680"/>
-            <a:ext cx="9065520" cy="4383000"/>
+            <a:ext cx="9065160" cy="4382640"/>
           </a:xfrm>
           <a:prstGeom prst="rect">
             <a:avLst/>
@@ -25690,7 +25850,7 @@
         <p:spPr>
           <a:xfrm>
             <a:off x="0" y="0"/>
-            <a:ext cx="10077120" cy="1561320"/>
+            <a:ext cx="10076760" cy="1560960"/>
           </a:xfrm>
           <a:prstGeom prst="rect">
             <a:avLst/>
@@ -25808,7 +25968,7 @@
         <p:spPr>
           <a:xfrm>
             <a:off x="502920" y="1768680"/>
-            <a:ext cx="9065520" cy="4383000"/>
+            <a:ext cx="9065160" cy="4382640"/>
           </a:xfrm>
           <a:prstGeom prst="rect">
             <a:avLst/>
@@ -25857,7 +26017,7 @@
         <p:spPr>
           <a:xfrm>
             <a:off x="0" y="0"/>
-            <a:ext cx="10077120" cy="1561320"/>
+            <a:ext cx="10076760" cy="1560960"/>
           </a:xfrm>
           <a:prstGeom prst="rect">
             <a:avLst/>
@@ -25965,7 +26125,7 @@
         <p:spPr>
           <a:xfrm>
             <a:off x="502920" y="1768680"/>
-            <a:ext cx="9065520" cy="4383000"/>
+            <a:ext cx="9065160" cy="4382640"/>
           </a:xfrm>
           <a:prstGeom prst="rect">
             <a:avLst/>
@@ -26014,7 +26174,7 @@
         <p:spPr>
           <a:xfrm>
             <a:off x="0" y="0"/>
-            <a:ext cx="10077120" cy="1561320"/>
+            <a:ext cx="10076760" cy="1560960"/>
           </a:xfrm>
           <a:prstGeom prst="rect">
             <a:avLst/>
@@ -26122,7 +26282,7 @@
         <p:spPr>
           <a:xfrm>
             <a:off x="502920" y="1768680"/>
-            <a:ext cx="9065520" cy="4383000"/>
+            <a:ext cx="9065160" cy="4382640"/>
           </a:xfrm>
           <a:prstGeom prst="rect">
             <a:avLst/>
@@ -26171,7 +26331,7 @@
         <p:spPr>
           <a:xfrm>
             <a:off x="0" y="0"/>
-            <a:ext cx="10077120" cy="1561320"/>
+            <a:ext cx="10076760" cy="1560960"/>
           </a:xfrm>
           <a:prstGeom prst="rect">
             <a:avLst/>
@@ -26279,7 +26439,7 @@
         <p:spPr>
           <a:xfrm>
             <a:off x="502920" y="1768680"/>
-            <a:ext cx="9065520" cy="4383000"/>
+            <a:ext cx="9065160" cy="4382640"/>
           </a:xfrm>
           <a:prstGeom prst="rect">
             <a:avLst/>
@@ -26328,7 +26488,7 @@
         <p:spPr>
           <a:xfrm>
             <a:off x="0" y="0"/>
-            <a:ext cx="10077120" cy="1561320"/>
+            <a:ext cx="10076760" cy="1560960"/>
           </a:xfrm>
           <a:prstGeom prst="rect">
             <a:avLst/>

</xml_diff>